<commit_message>
Add Animation & Layouts to SlideGeneration
</commit_message>
<xml_diff>
--- a/layouts.pptx
+++ b/layouts.pptx
@@ -2,7 +2,7 @@
 <file path=ppt/presentation.xml><?xml version="1.0" encoding="utf-8"?>
 <p:presentation xmlns:a="http://schemas.openxmlformats.org/drawingml/2006/main" xmlns:r="http://schemas.openxmlformats.org/officeDocument/2006/relationships" xmlns:p="http://schemas.openxmlformats.org/presentationml/2006/main" saveSubsetFonts="1">
   <p:sldMasterIdLst>
-    <p:sldMasterId id="2147483873" r:id="rId1"/>
+    <p:sldMasterId id="2147483908" r:id="rId1"/>
   </p:sldMasterIdLst>
   <p:sldIdLst>
     <p:sldId id="257" r:id="rId2"/>
@@ -357,7 +357,7 @@
           <a:noFill/>
           <a:extLst>
             <a:ext uri="{909E8E84-426E-40dd-AFC4-6F175D3DCCD1}">
-              <a14:hiddenFill xmlns="" xmlns:a14="http://schemas.microsoft.com/office/drawing/2010/main">
+              <a14:hiddenFill xmlns:a14="http://schemas.microsoft.com/office/drawing/2010/main" xmlns="">
                 <a:solidFill>
                   <a:srgbClr val="FFFFFF"/>
                 </a:solidFill>
@@ -417,7 +417,7 @@
             </a:ln>
             <a:extLst>
               <a:ext uri="{91240B29-F687-4f45-9708-019B960494DF}">
-                <a14:hiddenLine xmlns="" xmlns:a14="http://schemas.microsoft.com/office/drawing/2010/main" w="9525">
+                <a14:hiddenLine xmlns:a14="http://schemas.microsoft.com/office/drawing/2010/main" xmlns="" w="9525">
                   <a:solidFill>
                     <a:srgbClr val="000000"/>
                   </a:solidFill>
@@ -507,7 +507,7 @@
             </a:ln>
             <a:extLst>
               <a:ext uri="{91240B29-F687-4f45-9708-019B960494DF}">
-                <a14:hiddenLine xmlns="" xmlns:a14="http://schemas.microsoft.com/office/drawing/2010/main" w="9525">
+                <a14:hiddenLine xmlns:a14="http://schemas.microsoft.com/office/drawing/2010/main" xmlns="" w="9525">
                   <a:solidFill>
                     <a:srgbClr val="000000"/>
                   </a:solidFill>
@@ -597,7 +597,7 @@
             </a:ln>
             <a:extLst>
               <a:ext uri="{91240B29-F687-4f45-9708-019B960494DF}">
-                <a14:hiddenLine xmlns="" xmlns:a14="http://schemas.microsoft.com/office/drawing/2010/main" w="9525">
+                <a14:hiddenLine xmlns:a14="http://schemas.microsoft.com/office/drawing/2010/main" xmlns="" w="9525">
                   <a:solidFill>
                     <a:srgbClr val="000000"/>
                   </a:solidFill>
@@ -631,7 +631,7 @@
             </a:ln>
             <a:extLst>
               <a:ext uri="{91240B29-F687-4f45-9708-019B960494DF}">
-                <a14:hiddenLine xmlns="" xmlns:a14="http://schemas.microsoft.com/office/drawing/2010/main" w="9525">
+                <a14:hiddenLine xmlns:a14="http://schemas.microsoft.com/office/drawing/2010/main" xmlns="" w="9525">
                   <a:solidFill>
                     <a:srgbClr val="000000"/>
                   </a:solidFill>
@@ -721,7 +721,7 @@
             </a:ln>
             <a:extLst>
               <a:ext uri="{91240B29-F687-4f45-9708-019B960494DF}">
-                <a14:hiddenLine xmlns="" xmlns:a14="http://schemas.microsoft.com/office/drawing/2010/main" w="9525">
+                <a14:hiddenLine xmlns:a14="http://schemas.microsoft.com/office/drawing/2010/main" xmlns="" w="9525">
                   <a:solidFill>
                     <a:srgbClr val="000000"/>
                   </a:solidFill>
@@ -783,7 +783,7 @@
             </a:ln>
             <a:extLst>
               <a:ext uri="{91240B29-F687-4f45-9708-019B960494DF}">
-                <a14:hiddenLine xmlns="" xmlns:a14="http://schemas.microsoft.com/office/drawing/2010/main" w="9525">
+                <a14:hiddenLine xmlns:a14="http://schemas.microsoft.com/office/drawing/2010/main" xmlns="" w="9525">
                   <a:solidFill>
                     <a:srgbClr val="000000"/>
                   </a:solidFill>
@@ -845,7 +845,7 @@
             </a:ln>
             <a:extLst>
               <a:ext uri="{91240B29-F687-4f45-9708-019B960494DF}">
-                <a14:hiddenLine xmlns="" xmlns:a14="http://schemas.microsoft.com/office/drawing/2010/main" w="9525">
+                <a14:hiddenLine xmlns:a14="http://schemas.microsoft.com/office/drawing/2010/main" xmlns="" w="9525">
                   <a:solidFill>
                     <a:srgbClr val="000000"/>
                   </a:solidFill>
@@ -935,7 +935,7 @@
             </a:ln>
             <a:extLst>
               <a:ext uri="{91240B29-F687-4f45-9708-019B960494DF}">
-                <a14:hiddenLine xmlns="" xmlns:a14="http://schemas.microsoft.com/office/drawing/2010/main" w="9525">
+                <a14:hiddenLine xmlns:a14="http://schemas.microsoft.com/office/drawing/2010/main" xmlns="" w="9525">
                   <a:solidFill>
                     <a:srgbClr val="000000"/>
                   </a:solidFill>
@@ -997,7 +997,7 @@
             </a:ln>
             <a:extLst>
               <a:ext uri="{91240B29-F687-4f45-9708-019B960494DF}">
-                <a14:hiddenLine xmlns="" xmlns:a14="http://schemas.microsoft.com/office/drawing/2010/main" w="9525">
+                <a14:hiddenLine xmlns:a14="http://schemas.microsoft.com/office/drawing/2010/main" xmlns="" w="9525">
                   <a:solidFill>
                     <a:srgbClr val="000000"/>
                   </a:solidFill>
@@ -1059,7 +1059,7 @@
             </a:ln>
             <a:extLst>
               <a:ext uri="{91240B29-F687-4f45-9708-019B960494DF}">
-                <a14:hiddenLine xmlns="" xmlns:a14="http://schemas.microsoft.com/office/drawing/2010/main" w="9525">
+                <a14:hiddenLine xmlns:a14="http://schemas.microsoft.com/office/drawing/2010/main" xmlns="" w="9525">
                   <a:solidFill>
                     <a:srgbClr val="000000"/>
                   </a:solidFill>
@@ -1149,7 +1149,7 @@
             </a:ln>
             <a:extLst>
               <a:ext uri="{91240B29-F687-4f45-9708-019B960494DF}">
-                <a14:hiddenLine xmlns="" xmlns:a14="http://schemas.microsoft.com/office/drawing/2010/main" w="9525">
+                <a14:hiddenLine xmlns:a14="http://schemas.microsoft.com/office/drawing/2010/main" xmlns="" w="9525">
                   <a:solidFill>
                     <a:srgbClr val="000000"/>
                   </a:solidFill>
@@ -1239,7 +1239,7 @@
             </a:ln>
             <a:extLst>
               <a:ext uri="{91240B29-F687-4f45-9708-019B960494DF}">
-                <a14:hiddenLine xmlns="" xmlns:a14="http://schemas.microsoft.com/office/drawing/2010/main" w="9525">
+                <a14:hiddenLine xmlns:a14="http://schemas.microsoft.com/office/drawing/2010/main" xmlns="" w="9525">
                   <a:solidFill>
                     <a:srgbClr val="000000"/>
                   </a:solidFill>
@@ -1301,7 +1301,7 @@
             </a:ln>
             <a:extLst>
               <a:ext uri="{91240B29-F687-4f45-9708-019B960494DF}">
-                <a14:hiddenLine xmlns="" xmlns:a14="http://schemas.microsoft.com/office/drawing/2010/main" w="9525">
+                <a14:hiddenLine xmlns:a14="http://schemas.microsoft.com/office/drawing/2010/main" xmlns="" w="9525">
                   <a:solidFill>
                     <a:srgbClr val="000000"/>
                   </a:solidFill>
@@ -1411,7 +1411,7 @@
             </a:ln>
             <a:extLst>
               <a:ext uri="{91240B29-F687-4f45-9708-019B960494DF}">
-                <a14:hiddenLine xmlns="" xmlns:a14="http://schemas.microsoft.com/office/drawing/2010/main" w="9525">
+                <a14:hiddenLine xmlns:a14="http://schemas.microsoft.com/office/drawing/2010/main" xmlns="" w="9525">
                   <a:solidFill>
                     <a:srgbClr val="000000"/>
                   </a:solidFill>
@@ -1473,7 +1473,7 @@
             </a:ln>
             <a:extLst>
               <a:ext uri="{91240B29-F687-4f45-9708-019B960494DF}">
-                <a14:hiddenLine xmlns="" xmlns:a14="http://schemas.microsoft.com/office/drawing/2010/main" w="9525">
+                <a14:hiddenLine xmlns:a14="http://schemas.microsoft.com/office/drawing/2010/main" xmlns="" w="9525">
                   <a:solidFill>
                     <a:srgbClr val="000000"/>
                   </a:solidFill>
@@ -1563,7 +1563,7 @@
             </a:ln>
             <a:extLst>
               <a:ext uri="{91240B29-F687-4f45-9708-019B960494DF}">
-                <a14:hiddenLine xmlns="" xmlns:a14="http://schemas.microsoft.com/office/drawing/2010/main" w="9525">
+                <a14:hiddenLine xmlns:a14="http://schemas.microsoft.com/office/drawing/2010/main" xmlns="" w="9525">
                   <a:solidFill>
                     <a:srgbClr val="000000"/>
                   </a:solidFill>
@@ -1653,7 +1653,7 @@
             </a:ln>
             <a:extLst>
               <a:ext uri="{91240B29-F687-4f45-9708-019B960494DF}">
-                <a14:hiddenLine xmlns="" xmlns:a14="http://schemas.microsoft.com/office/drawing/2010/main" w="9525">
+                <a14:hiddenLine xmlns:a14="http://schemas.microsoft.com/office/drawing/2010/main" xmlns="" w="9525">
                   <a:solidFill>
                     <a:srgbClr val="000000"/>
                   </a:solidFill>
@@ -1715,7 +1715,7 @@
             </a:ln>
             <a:extLst>
               <a:ext uri="{91240B29-F687-4f45-9708-019B960494DF}">
-                <a14:hiddenLine xmlns="" xmlns:a14="http://schemas.microsoft.com/office/drawing/2010/main" w="9525">
+                <a14:hiddenLine xmlns:a14="http://schemas.microsoft.com/office/drawing/2010/main" xmlns="" w="9525">
                   <a:solidFill>
                     <a:srgbClr val="000000"/>
                   </a:solidFill>
@@ -1805,7 +1805,7 @@
             </a:ln>
             <a:extLst>
               <a:ext uri="{91240B29-F687-4f45-9708-019B960494DF}">
-                <a14:hiddenLine xmlns="" xmlns:a14="http://schemas.microsoft.com/office/drawing/2010/main" w="9525">
+                <a14:hiddenLine xmlns:a14="http://schemas.microsoft.com/office/drawing/2010/main" xmlns="" w="9525">
                   <a:solidFill>
                     <a:srgbClr val="000000"/>
                   </a:solidFill>
@@ -1895,7 +1895,7 @@
             </a:ln>
             <a:extLst>
               <a:ext uri="{91240B29-F687-4f45-9708-019B960494DF}">
-                <a14:hiddenLine xmlns="" xmlns:a14="http://schemas.microsoft.com/office/drawing/2010/main" w="9525">
+                <a14:hiddenLine xmlns:a14="http://schemas.microsoft.com/office/drawing/2010/main" xmlns="" w="9525">
                   <a:solidFill>
                     <a:srgbClr val="000000"/>
                   </a:solidFill>
@@ -1951,7 +1951,7 @@
             </a:ln>
             <a:extLst>
               <a:ext uri="{91240B29-F687-4f45-9708-019B960494DF}">
-                <a14:hiddenLine xmlns="" xmlns:a14="http://schemas.microsoft.com/office/drawing/2010/main" w="9525">
+                <a14:hiddenLine xmlns:a14="http://schemas.microsoft.com/office/drawing/2010/main" xmlns="" w="9525">
                   <a:solidFill>
                     <a:srgbClr val="000000"/>
                   </a:solidFill>
@@ -2041,7 +2041,7 @@
             </a:ln>
             <a:extLst>
               <a:ext uri="{91240B29-F687-4f45-9708-019B960494DF}">
-                <a14:hiddenLine xmlns="" xmlns:a14="http://schemas.microsoft.com/office/drawing/2010/main" w="9525">
+                <a14:hiddenLine xmlns:a14="http://schemas.microsoft.com/office/drawing/2010/main" xmlns="" w="9525">
                   <a:solidFill>
                     <a:srgbClr val="000000"/>
                   </a:solidFill>
@@ -2097,7 +2097,7 @@
             </a:ln>
             <a:extLst>
               <a:ext uri="{91240B29-F687-4f45-9708-019B960494DF}">
-                <a14:hiddenLine xmlns="" xmlns:a14="http://schemas.microsoft.com/office/drawing/2010/main" w="9525">
+                <a14:hiddenLine xmlns:a14="http://schemas.microsoft.com/office/drawing/2010/main" xmlns="" w="9525">
                   <a:solidFill>
                     <a:srgbClr val="000000"/>
                   </a:solidFill>
@@ -2187,7 +2187,7 @@
             </a:ln>
             <a:extLst>
               <a:ext uri="{91240B29-F687-4f45-9708-019B960494DF}">
-                <a14:hiddenLine xmlns="" xmlns:a14="http://schemas.microsoft.com/office/drawing/2010/main" w="9525">
+                <a14:hiddenLine xmlns:a14="http://schemas.microsoft.com/office/drawing/2010/main" xmlns="" w="9525">
                   <a:solidFill>
                     <a:srgbClr val="000000"/>
                   </a:solidFill>
@@ -2255,7 +2255,7 @@
             </a:ln>
             <a:extLst>
               <a:ext uri="{91240B29-F687-4f45-9708-019B960494DF}">
-                <a14:hiddenLine xmlns="" xmlns:a14="http://schemas.microsoft.com/office/drawing/2010/main" w="9525">
+                <a14:hiddenLine xmlns:a14="http://schemas.microsoft.com/office/drawing/2010/main" xmlns="" w="9525">
                   <a:solidFill>
                     <a:srgbClr val="000000"/>
                   </a:solidFill>
@@ -2345,7 +2345,7 @@
             </a:ln>
             <a:extLst>
               <a:ext uri="{91240B29-F687-4f45-9708-019B960494DF}">
-                <a14:hiddenLine xmlns="" xmlns:a14="http://schemas.microsoft.com/office/drawing/2010/main" w="9525">
+                <a14:hiddenLine xmlns:a14="http://schemas.microsoft.com/office/drawing/2010/main" xmlns="" w="9525">
                   <a:solidFill>
                     <a:srgbClr val="000000"/>
                   </a:solidFill>
@@ -2413,7 +2413,7 @@
             </a:ln>
             <a:extLst>
               <a:ext uri="{91240B29-F687-4f45-9708-019B960494DF}">
-                <a14:hiddenLine xmlns="" xmlns:a14="http://schemas.microsoft.com/office/drawing/2010/main" w="9525">
+                <a14:hiddenLine xmlns:a14="http://schemas.microsoft.com/office/drawing/2010/main" xmlns="" w="9525">
                   <a:solidFill>
                     <a:srgbClr val="000000"/>
                   </a:solidFill>
@@ -2503,7 +2503,7 @@
             </a:ln>
             <a:extLst>
               <a:ext uri="{91240B29-F687-4f45-9708-019B960494DF}">
-                <a14:hiddenLine xmlns="" xmlns:a14="http://schemas.microsoft.com/office/drawing/2010/main" w="9525">
+                <a14:hiddenLine xmlns:a14="http://schemas.microsoft.com/office/drawing/2010/main" xmlns="" w="9525">
                   <a:solidFill>
                     <a:srgbClr val="000000"/>
                   </a:solidFill>
@@ -2537,7 +2537,7 @@
             </a:ln>
             <a:extLst>
               <a:ext uri="{91240B29-F687-4f45-9708-019B960494DF}">
-                <a14:hiddenLine xmlns="" xmlns:a14="http://schemas.microsoft.com/office/drawing/2010/main" w="9525">
+                <a14:hiddenLine xmlns:a14="http://schemas.microsoft.com/office/drawing/2010/main" xmlns="" w="9525">
                   <a:solidFill>
                     <a:srgbClr val="000000"/>
                   </a:solidFill>
@@ -2627,7 +2627,7 @@
             </a:ln>
             <a:extLst>
               <a:ext uri="{91240B29-F687-4f45-9708-019B960494DF}">
-                <a14:hiddenLine xmlns="" xmlns:a14="http://schemas.microsoft.com/office/drawing/2010/main" w="9525">
+                <a14:hiddenLine xmlns:a14="http://schemas.microsoft.com/office/drawing/2010/main" xmlns="" w="9525">
                   <a:solidFill>
                     <a:srgbClr val="000000"/>
                   </a:solidFill>
@@ -2689,7 +2689,7 @@
             </a:ln>
             <a:extLst>
               <a:ext uri="{91240B29-F687-4f45-9708-019B960494DF}">
-                <a14:hiddenLine xmlns="" xmlns:a14="http://schemas.microsoft.com/office/drawing/2010/main" w="9525">
+                <a14:hiddenLine xmlns:a14="http://schemas.microsoft.com/office/drawing/2010/main" xmlns="" w="9525">
                   <a:solidFill>
                     <a:srgbClr val="000000"/>
                   </a:solidFill>
@@ -2751,7 +2751,7 @@
             </a:ln>
             <a:extLst>
               <a:ext uri="{91240B29-F687-4f45-9708-019B960494DF}">
-                <a14:hiddenLine xmlns="" xmlns:a14="http://schemas.microsoft.com/office/drawing/2010/main" w="9525">
+                <a14:hiddenLine xmlns:a14="http://schemas.microsoft.com/office/drawing/2010/main" xmlns="" w="9525">
                   <a:solidFill>
                     <a:srgbClr val="000000"/>
                   </a:solidFill>
@@ -2841,7 +2841,7 @@
             </a:ln>
             <a:extLst>
               <a:ext uri="{91240B29-F687-4f45-9708-019B960494DF}">
-                <a14:hiddenLine xmlns="" xmlns:a14="http://schemas.microsoft.com/office/drawing/2010/main" w="9525">
+                <a14:hiddenLine xmlns:a14="http://schemas.microsoft.com/office/drawing/2010/main" xmlns="" w="9525">
                   <a:solidFill>
                     <a:srgbClr val="000000"/>
                   </a:solidFill>
@@ -2909,7 +2909,7 @@
             </a:ln>
             <a:extLst>
               <a:ext uri="{91240B29-F687-4f45-9708-019B960494DF}">
-                <a14:hiddenLine xmlns="" xmlns:a14="http://schemas.microsoft.com/office/drawing/2010/main" w="9525">
+                <a14:hiddenLine xmlns:a14="http://schemas.microsoft.com/office/drawing/2010/main" xmlns="" w="9525">
                   <a:solidFill>
                     <a:srgbClr val="000000"/>
                   </a:solidFill>
@@ -2971,7 +2971,7 @@
             </a:ln>
             <a:extLst>
               <a:ext uri="{91240B29-F687-4f45-9708-019B960494DF}">
-                <a14:hiddenLine xmlns="" xmlns:a14="http://schemas.microsoft.com/office/drawing/2010/main" w="9525">
+                <a14:hiddenLine xmlns:a14="http://schemas.microsoft.com/office/drawing/2010/main" xmlns="" w="9525">
                   <a:solidFill>
                     <a:srgbClr val="000000"/>
                   </a:solidFill>
@@ -3061,7 +3061,7 @@
             </a:ln>
             <a:extLst>
               <a:ext uri="{91240B29-F687-4f45-9708-019B960494DF}">
-                <a14:hiddenLine xmlns="" xmlns:a14="http://schemas.microsoft.com/office/drawing/2010/main" w="9525">
+                <a14:hiddenLine xmlns:a14="http://schemas.microsoft.com/office/drawing/2010/main" xmlns="" w="9525">
                   <a:solidFill>
                     <a:srgbClr val="000000"/>
                   </a:solidFill>
@@ -3123,7 +3123,7 @@
             </a:ln>
             <a:extLst>
               <a:ext uri="{91240B29-F687-4f45-9708-019B960494DF}">
-                <a14:hiddenLine xmlns="" xmlns:a14="http://schemas.microsoft.com/office/drawing/2010/main" w="9525">
+                <a14:hiddenLine xmlns:a14="http://schemas.microsoft.com/office/drawing/2010/main" xmlns="" w="9525">
                   <a:solidFill>
                     <a:srgbClr val="000000"/>
                   </a:solidFill>
@@ -3213,7 +3213,7 @@
             </a:ln>
             <a:extLst>
               <a:ext uri="{91240B29-F687-4f45-9708-019B960494DF}">
-                <a14:hiddenLine xmlns="" xmlns:a14="http://schemas.microsoft.com/office/drawing/2010/main" w="9525">
+                <a14:hiddenLine xmlns:a14="http://schemas.microsoft.com/office/drawing/2010/main" xmlns="" w="9525">
                   <a:solidFill>
                     <a:srgbClr val="000000"/>
                   </a:solidFill>
@@ -3275,7 +3275,7 @@
             </a:ln>
             <a:extLst>
               <a:ext uri="{91240B29-F687-4f45-9708-019B960494DF}">
-                <a14:hiddenLine xmlns="" xmlns:a14="http://schemas.microsoft.com/office/drawing/2010/main" w="9525">
+                <a14:hiddenLine xmlns:a14="http://schemas.microsoft.com/office/drawing/2010/main" xmlns="" w="9525">
                   <a:solidFill>
                     <a:srgbClr val="000000"/>
                   </a:solidFill>
@@ -3365,7 +3365,7 @@
             </a:ln>
             <a:extLst>
               <a:ext uri="{91240B29-F687-4f45-9708-019B960494DF}">
-                <a14:hiddenLine xmlns="" xmlns:a14="http://schemas.microsoft.com/office/drawing/2010/main" w="9525">
+                <a14:hiddenLine xmlns:a14="http://schemas.microsoft.com/office/drawing/2010/main" xmlns="" w="9525">
                   <a:solidFill>
                     <a:srgbClr val="000000"/>
                   </a:solidFill>
@@ -3399,7 +3399,7 @@
             </a:ln>
             <a:extLst>
               <a:ext uri="{91240B29-F687-4f45-9708-019B960494DF}">
-                <a14:hiddenLine xmlns="" xmlns:a14="http://schemas.microsoft.com/office/drawing/2010/main" w="9525">
+                <a14:hiddenLine xmlns:a14="http://schemas.microsoft.com/office/drawing/2010/main" xmlns="" w="9525">
                   <a:solidFill>
                     <a:srgbClr val="000000"/>
                   </a:solidFill>
@@ -3464,7 +3464,7 @@
             </a:ln>
             <a:extLst>
               <a:ext uri="{91240B29-F687-4f45-9708-019B960494DF}">
-                <a14:hiddenLine xmlns="" xmlns:a14="http://schemas.microsoft.com/office/drawing/2010/main" w="9525">
+                <a14:hiddenLine xmlns:a14="http://schemas.microsoft.com/office/drawing/2010/main" xmlns="" w="9525">
                   <a:solidFill>
                     <a:srgbClr val="000000"/>
                   </a:solidFill>
@@ -3554,7 +3554,7 @@
             </a:ln>
             <a:extLst>
               <a:ext uri="{91240B29-F687-4f45-9708-019B960494DF}">
-                <a14:hiddenLine xmlns="" xmlns:a14="http://schemas.microsoft.com/office/drawing/2010/main" w="9525">
+                <a14:hiddenLine xmlns:a14="http://schemas.microsoft.com/office/drawing/2010/main" xmlns="" w="9525">
                   <a:solidFill>
                     <a:srgbClr val="000000"/>
                   </a:solidFill>
@@ -3616,7 +3616,7 @@
             </a:ln>
             <a:extLst>
               <a:ext uri="{91240B29-F687-4f45-9708-019B960494DF}">
-                <a14:hiddenLine xmlns="" xmlns:a14="http://schemas.microsoft.com/office/drawing/2010/main" w="9525">
+                <a14:hiddenLine xmlns:a14="http://schemas.microsoft.com/office/drawing/2010/main" xmlns="" w="9525">
                   <a:solidFill>
                     <a:srgbClr val="000000"/>
                   </a:solidFill>
@@ -3706,7 +3706,7 @@
             </a:ln>
             <a:extLst>
               <a:ext uri="{91240B29-F687-4f45-9708-019B960494DF}">
-                <a14:hiddenLine xmlns="" xmlns:a14="http://schemas.microsoft.com/office/drawing/2010/main" w="9525">
+                <a14:hiddenLine xmlns:a14="http://schemas.microsoft.com/office/drawing/2010/main" xmlns="" w="9525">
                   <a:solidFill>
                     <a:srgbClr val="000000"/>
                   </a:solidFill>
@@ -3796,7 +3796,7 @@
             </a:ln>
             <a:extLst>
               <a:ext uri="{91240B29-F687-4f45-9708-019B960494DF}">
-                <a14:hiddenLine xmlns="" xmlns:a14="http://schemas.microsoft.com/office/drawing/2010/main" w="9525">
+                <a14:hiddenLine xmlns:a14="http://schemas.microsoft.com/office/drawing/2010/main" xmlns="" w="9525">
                   <a:solidFill>
                     <a:srgbClr val="000000"/>
                   </a:solidFill>
@@ -3861,7 +3861,7 @@
             </a:ln>
             <a:extLst>
               <a:ext uri="{91240B29-F687-4f45-9708-019B960494DF}">
-                <a14:hiddenLine xmlns="" xmlns:a14="http://schemas.microsoft.com/office/drawing/2010/main" w="9525">
+                <a14:hiddenLine xmlns:a14="http://schemas.microsoft.com/office/drawing/2010/main" xmlns="" w="9525">
                   <a:solidFill>
                     <a:srgbClr val="000000"/>
                   </a:solidFill>
@@ -3923,7 +3923,7 @@
             </a:ln>
             <a:extLst>
               <a:ext uri="{91240B29-F687-4f45-9708-019B960494DF}">
-                <a14:hiddenLine xmlns="" xmlns:a14="http://schemas.microsoft.com/office/drawing/2010/main" w="9525">
+                <a14:hiddenLine xmlns:a14="http://schemas.microsoft.com/office/drawing/2010/main" xmlns="" w="9525">
                   <a:solidFill>
                     <a:srgbClr val="000000"/>
                   </a:solidFill>
@@ -4013,7 +4013,7 @@
             </a:ln>
             <a:extLst>
               <a:ext uri="{91240B29-F687-4f45-9708-019B960494DF}">
-                <a14:hiddenLine xmlns="" xmlns:a14="http://schemas.microsoft.com/office/drawing/2010/main" w="9525">
+                <a14:hiddenLine xmlns:a14="http://schemas.microsoft.com/office/drawing/2010/main" xmlns="" w="9525">
                   <a:solidFill>
                     <a:srgbClr val="000000"/>
                   </a:solidFill>
@@ -4103,7 +4103,7 @@
             </a:ln>
             <a:extLst>
               <a:ext uri="{91240B29-F687-4f45-9708-019B960494DF}">
-                <a14:hiddenLine xmlns="" xmlns:a14="http://schemas.microsoft.com/office/drawing/2010/main" w="9525">
+                <a14:hiddenLine xmlns:a14="http://schemas.microsoft.com/office/drawing/2010/main" xmlns="" w="9525">
                   <a:solidFill>
                     <a:srgbClr val="000000"/>
                   </a:solidFill>
@@ -4165,7 +4165,7 @@
             </a:ln>
             <a:extLst>
               <a:ext uri="{91240B29-F687-4f45-9708-019B960494DF}">
-                <a14:hiddenLine xmlns="" xmlns:a14="http://schemas.microsoft.com/office/drawing/2010/main" w="9525">
+                <a14:hiddenLine xmlns:a14="http://schemas.microsoft.com/office/drawing/2010/main" xmlns="" w="9525">
                   <a:solidFill>
                     <a:srgbClr val="000000"/>
                   </a:solidFill>
@@ -4285,7 +4285,7 @@
             </a:ln>
             <a:extLst>
               <a:ext uri="{91240B29-F687-4f45-9708-019B960494DF}">
-                <a14:hiddenLine xmlns="" xmlns:a14="http://schemas.microsoft.com/office/drawing/2010/main" w="9525">
+                <a14:hiddenLine xmlns:a14="http://schemas.microsoft.com/office/drawing/2010/main" xmlns="" w="9525">
                   <a:solidFill>
                     <a:srgbClr val="000000"/>
                   </a:solidFill>
@@ -4353,7 +4353,7 @@
             </a:ln>
             <a:extLst>
               <a:ext uri="{91240B29-F687-4f45-9708-019B960494DF}">
-                <a14:hiddenLine xmlns="" xmlns:a14="http://schemas.microsoft.com/office/drawing/2010/main" w="9525">
+                <a14:hiddenLine xmlns:a14="http://schemas.microsoft.com/office/drawing/2010/main" xmlns="" w="9525">
                   <a:solidFill>
                     <a:srgbClr val="000000"/>
                   </a:solidFill>
@@ -4443,7 +4443,7 @@
             </a:ln>
             <a:extLst>
               <a:ext uri="{91240B29-F687-4f45-9708-019B960494DF}">
-                <a14:hiddenLine xmlns="" xmlns:a14="http://schemas.microsoft.com/office/drawing/2010/main" w="9525">
+                <a14:hiddenLine xmlns:a14="http://schemas.microsoft.com/office/drawing/2010/main" xmlns="" w="9525">
                   <a:solidFill>
                     <a:srgbClr val="000000"/>
                   </a:solidFill>
@@ -4583,9 +4583,9 @@
           <a:p>
             <a:fld id="{E0C5E198-763C-4A3F-B341-641177DB07D5}" type="datetimeFigureOut">
               <a:rPr lang="en-US" smtClean="0"/>
-              <a:t>2/22/2026</a:t>
+              <a:t>2/24/2026</a:t>
             </a:fld>
-            <a:endParaRPr lang="en-US"/>
+            <a:endParaRPr lang="en-US" dirty="0"/>
           </a:p>
         </p:txBody>
       </p:sp>
@@ -4609,7 +4609,7 @@
           <a:bodyPr/>
           <a:lstStyle/>
           <a:p>
-            <a:endParaRPr lang="en-US"/>
+            <a:endParaRPr lang="en-US" dirty="0"/>
           </a:p>
         </p:txBody>
       </p:sp>
@@ -4637,14 +4637,14 @@
               <a:rPr lang="en-US" smtClean="0"/>
               <a:t>‹#›</a:t>
             </a:fld>
-            <a:endParaRPr lang="en-US"/>
+            <a:endParaRPr lang="en-US" dirty="0"/>
           </a:p>
         </p:txBody>
       </p:sp>
     </p:spTree>
     <p:extLst>
       <p:ext uri="{BB962C8B-B14F-4D97-AF65-F5344CB8AC3E}">
-        <p14:creationId xmlns:p14="http://schemas.microsoft.com/office/powerpoint/2010/main" val="1408863801"/>
+        <p14:creationId xmlns:p14="http://schemas.microsoft.com/office/powerpoint/2010/main" val="1110822596"/>
       </p:ext>
     </p:extLst>
   </p:cSld>
@@ -4850,9 +4850,9 @@
           <a:p>
             <a:fld id="{E0C5E198-763C-4A3F-B341-641177DB07D5}" type="datetimeFigureOut">
               <a:rPr lang="en-US" smtClean="0"/>
-              <a:t>2/22/2026</a:t>
+              <a:t>2/24/2026</a:t>
             </a:fld>
-            <a:endParaRPr lang="en-US"/>
+            <a:endParaRPr lang="en-US" dirty="0"/>
           </a:p>
         </p:txBody>
       </p:sp>
@@ -4871,7 +4871,7 @@
           <a:bodyPr/>
           <a:lstStyle/>
           <a:p>
-            <a:endParaRPr lang="en-US"/>
+            <a:endParaRPr lang="en-US" dirty="0"/>
           </a:p>
         </p:txBody>
       </p:sp>
@@ -4894,14 +4894,14 @@
               <a:rPr lang="en-US" smtClean="0"/>
               <a:t>‹#›</a:t>
             </a:fld>
-            <a:endParaRPr lang="en-US"/>
+            <a:endParaRPr lang="en-US" dirty="0"/>
           </a:p>
         </p:txBody>
       </p:sp>
     </p:spTree>
     <p:extLst>
       <p:ext uri="{BB962C8B-B14F-4D97-AF65-F5344CB8AC3E}">
-        <p14:creationId xmlns:p14="http://schemas.microsoft.com/office/powerpoint/2010/main" val="2773977713"/>
+        <p14:creationId xmlns:p14="http://schemas.microsoft.com/office/powerpoint/2010/main" val="2052941424"/>
       </p:ext>
     </p:extLst>
   </p:cSld>
@@ -5046,9 +5046,9 @@
           <a:p>
             <a:fld id="{E0C5E198-763C-4A3F-B341-641177DB07D5}" type="datetimeFigureOut">
               <a:rPr lang="en-US" smtClean="0"/>
-              <a:t>2/22/2026</a:t>
+              <a:t>2/24/2026</a:t>
             </a:fld>
-            <a:endParaRPr lang="en-US"/>
+            <a:endParaRPr lang="en-US" dirty="0"/>
           </a:p>
         </p:txBody>
       </p:sp>
@@ -5067,7 +5067,7 @@
           <a:bodyPr/>
           <a:lstStyle/>
           <a:p>
-            <a:endParaRPr lang="en-US"/>
+            <a:endParaRPr lang="en-US" dirty="0"/>
           </a:p>
         </p:txBody>
       </p:sp>
@@ -5090,14 +5090,14 @@
               <a:rPr lang="en-US" smtClean="0"/>
               <a:t>‹#›</a:t>
             </a:fld>
-            <a:endParaRPr lang="en-US"/>
+            <a:endParaRPr lang="en-US" dirty="0"/>
           </a:p>
         </p:txBody>
       </p:sp>
     </p:spTree>
     <p:extLst>
       <p:ext uri="{BB962C8B-B14F-4D97-AF65-F5344CB8AC3E}">
-        <p14:creationId xmlns:p14="http://schemas.microsoft.com/office/powerpoint/2010/main" val="2613997916"/>
+        <p14:creationId xmlns:p14="http://schemas.microsoft.com/office/powerpoint/2010/main" val="2816940072"/>
       </p:ext>
     </p:extLst>
   </p:cSld>
@@ -5309,9 +5309,9 @@
           <a:p>
             <a:fld id="{E0C5E198-763C-4A3F-B341-641177DB07D5}" type="datetimeFigureOut">
               <a:rPr lang="en-US" smtClean="0"/>
-              <a:t>2/22/2026</a:t>
+              <a:t>2/24/2026</a:t>
             </a:fld>
-            <a:endParaRPr lang="en-US"/>
+            <a:endParaRPr lang="en-US" dirty="0"/>
           </a:p>
         </p:txBody>
       </p:sp>
@@ -5330,7 +5330,7 @@
           <a:bodyPr/>
           <a:lstStyle/>
           <a:p>
-            <a:endParaRPr lang="en-US"/>
+            <a:endParaRPr lang="en-US" dirty="0"/>
           </a:p>
         </p:txBody>
       </p:sp>
@@ -5353,7 +5353,7 @@
               <a:rPr lang="en-US" smtClean="0"/>
               <a:t>‹#›</a:t>
             </a:fld>
-            <a:endParaRPr lang="en-US"/>
+            <a:endParaRPr lang="en-US" dirty="0"/>
           </a:p>
         </p:txBody>
       </p:sp>
@@ -5598,7 +5598,7 @@
     </p:spTree>
     <p:extLst>
       <p:ext uri="{BB962C8B-B14F-4D97-AF65-F5344CB8AC3E}">
-        <p14:creationId xmlns:p14="http://schemas.microsoft.com/office/powerpoint/2010/main" val="3726014321"/>
+        <p14:creationId xmlns:p14="http://schemas.microsoft.com/office/powerpoint/2010/main" val="3259186602"/>
       </p:ext>
     </p:extLst>
   </p:cSld>
@@ -5743,9 +5743,9 @@
           <a:p>
             <a:fld id="{E0C5E198-763C-4A3F-B341-641177DB07D5}" type="datetimeFigureOut">
               <a:rPr lang="en-US" smtClean="0"/>
-              <a:t>2/22/2026</a:t>
+              <a:t>2/24/2026</a:t>
             </a:fld>
-            <a:endParaRPr lang="en-US"/>
+            <a:endParaRPr lang="en-US" dirty="0"/>
           </a:p>
         </p:txBody>
       </p:sp>
@@ -5764,7 +5764,7 @@
           <a:bodyPr/>
           <a:lstStyle/>
           <a:p>
-            <a:endParaRPr lang="en-US"/>
+            <a:endParaRPr lang="en-US" dirty="0"/>
           </a:p>
         </p:txBody>
       </p:sp>
@@ -5787,14 +5787,14 @@
               <a:rPr lang="en-US" smtClean="0"/>
               <a:t>‹#›</a:t>
             </a:fld>
-            <a:endParaRPr lang="en-US"/>
+            <a:endParaRPr lang="en-US" dirty="0"/>
           </a:p>
         </p:txBody>
       </p:sp>
     </p:spTree>
     <p:extLst>
       <p:ext uri="{BB962C8B-B14F-4D97-AF65-F5344CB8AC3E}">
-        <p14:creationId xmlns:p14="http://schemas.microsoft.com/office/powerpoint/2010/main" val="42206302"/>
+        <p14:creationId xmlns:p14="http://schemas.microsoft.com/office/powerpoint/2010/main" val="19958187"/>
       </p:ext>
     </p:extLst>
   </p:cSld>
@@ -6289,9 +6289,9 @@
           <a:p>
             <a:fld id="{E0C5E198-763C-4A3F-B341-641177DB07D5}" type="datetimeFigureOut">
               <a:rPr lang="en-US" smtClean="0"/>
-              <a:t>2/22/2026</a:t>
+              <a:t>2/24/2026</a:t>
             </a:fld>
-            <a:endParaRPr lang="en-US"/>
+            <a:endParaRPr lang="en-US" dirty="0"/>
           </a:p>
         </p:txBody>
       </p:sp>
@@ -6310,7 +6310,7 @@
           <a:bodyPr/>
           <a:lstStyle/>
           <a:p>
-            <a:endParaRPr lang="en-US"/>
+            <a:endParaRPr lang="en-US" dirty="0"/>
           </a:p>
         </p:txBody>
       </p:sp>
@@ -6333,14 +6333,14 @@
               <a:rPr lang="en-US" smtClean="0"/>
               <a:t>‹#›</a:t>
             </a:fld>
-            <a:endParaRPr lang="en-US"/>
+            <a:endParaRPr lang="en-US" dirty="0"/>
           </a:p>
         </p:txBody>
       </p:sp>
     </p:spTree>
     <p:extLst>
       <p:ext uri="{BB962C8B-B14F-4D97-AF65-F5344CB8AC3E}">
-        <p14:creationId xmlns:p14="http://schemas.microsoft.com/office/powerpoint/2010/main" val="1957175058"/>
+        <p14:creationId xmlns:p14="http://schemas.microsoft.com/office/powerpoint/2010/main" val="2249192383"/>
       </p:ext>
     </p:extLst>
   </p:cSld>
@@ -7009,9 +7009,9 @@
           <a:p>
             <a:fld id="{E0C5E198-763C-4A3F-B341-641177DB07D5}" type="datetimeFigureOut">
               <a:rPr lang="en-US" smtClean="0"/>
-              <a:t>2/22/2026</a:t>
+              <a:t>2/24/2026</a:t>
             </a:fld>
-            <a:endParaRPr lang="en-US"/>
+            <a:endParaRPr lang="en-US" dirty="0"/>
           </a:p>
         </p:txBody>
       </p:sp>
@@ -7030,7 +7030,7 @@
           <a:bodyPr/>
           <a:lstStyle/>
           <a:p>
-            <a:endParaRPr lang="en-US"/>
+            <a:endParaRPr lang="en-US" dirty="0"/>
           </a:p>
         </p:txBody>
       </p:sp>
@@ -7053,14 +7053,14 @@
               <a:rPr lang="en-US" smtClean="0"/>
               <a:t>‹#›</a:t>
             </a:fld>
-            <a:endParaRPr lang="en-US"/>
+            <a:endParaRPr lang="en-US" dirty="0"/>
           </a:p>
         </p:txBody>
       </p:sp>
     </p:spTree>
     <p:extLst>
       <p:ext uri="{BB962C8B-B14F-4D97-AF65-F5344CB8AC3E}">
-        <p14:creationId xmlns:p14="http://schemas.microsoft.com/office/powerpoint/2010/main" val="1665816893"/>
+        <p14:creationId xmlns:p14="http://schemas.microsoft.com/office/powerpoint/2010/main" val="840913434"/>
       </p:ext>
     </p:extLst>
   </p:cSld>
@@ -7179,9 +7179,9 @@
           <a:p>
             <a:fld id="{E0C5E198-763C-4A3F-B341-641177DB07D5}" type="datetimeFigureOut">
               <a:rPr lang="en-US" smtClean="0"/>
-              <a:t>2/22/2026</a:t>
+              <a:t>2/24/2026</a:t>
             </a:fld>
-            <a:endParaRPr lang="en-US"/>
+            <a:endParaRPr lang="en-US" dirty="0"/>
           </a:p>
         </p:txBody>
       </p:sp>
@@ -7200,7 +7200,7 @@
           <a:bodyPr/>
           <a:lstStyle/>
           <a:p>
-            <a:endParaRPr lang="en-US"/>
+            <a:endParaRPr lang="en-US" dirty="0"/>
           </a:p>
         </p:txBody>
       </p:sp>
@@ -7223,14 +7223,14 @@
               <a:rPr lang="en-US" smtClean="0"/>
               <a:t>‹#›</a:t>
             </a:fld>
-            <a:endParaRPr lang="en-US"/>
+            <a:endParaRPr lang="en-US" dirty="0"/>
           </a:p>
         </p:txBody>
       </p:sp>
     </p:spTree>
     <p:extLst>
       <p:ext uri="{BB962C8B-B14F-4D97-AF65-F5344CB8AC3E}">
-        <p14:creationId xmlns:p14="http://schemas.microsoft.com/office/powerpoint/2010/main" val="697419423"/>
+        <p14:creationId xmlns:p14="http://schemas.microsoft.com/office/powerpoint/2010/main" val="2047226388"/>
       </p:ext>
     </p:extLst>
   </p:cSld>
@@ -7359,9 +7359,9 @@
           <a:p>
             <a:fld id="{E0C5E198-763C-4A3F-B341-641177DB07D5}" type="datetimeFigureOut">
               <a:rPr lang="en-US" smtClean="0"/>
-              <a:t>2/22/2026</a:t>
+              <a:t>2/24/2026</a:t>
             </a:fld>
-            <a:endParaRPr lang="en-US"/>
+            <a:endParaRPr lang="en-US" dirty="0"/>
           </a:p>
         </p:txBody>
       </p:sp>
@@ -7380,7 +7380,7 @@
           <a:bodyPr/>
           <a:lstStyle/>
           <a:p>
-            <a:endParaRPr lang="en-US"/>
+            <a:endParaRPr lang="en-US" dirty="0"/>
           </a:p>
         </p:txBody>
       </p:sp>
@@ -7403,14 +7403,14 @@
               <a:rPr lang="en-US" smtClean="0"/>
               <a:t>‹#›</a:t>
             </a:fld>
-            <a:endParaRPr lang="en-US"/>
+            <a:endParaRPr lang="en-US" dirty="0"/>
           </a:p>
         </p:txBody>
       </p:sp>
     </p:spTree>
     <p:extLst>
       <p:ext uri="{BB962C8B-B14F-4D97-AF65-F5344CB8AC3E}">
-        <p14:creationId xmlns:p14="http://schemas.microsoft.com/office/powerpoint/2010/main" val="2062171591"/>
+        <p14:creationId xmlns:p14="http://schemas.microsoft.com/office/powerpoint/2010/main" val="344959548"/>
       </p:ext>
     </p:extLst>
   </p:cSld>
@@ -7529,9 +7529,9 @@
           <a:p>
             <a:fld id="{E0C5E198-763C-4A3F-B341-641177DB07D5}" type="datetimeFigureOut">
               <a:rPr lang="en-US" smtClean="0"/>
-              <a:t>2/22/2026</a:t>
+              <a:t>2/24/2026</a:t>
             </a:fld>
-            <a:endParaRPr lang="en-US"/>
+            <a:endParaRPr lang="en-US" dirty="0"/>
           </a:p>
         </p:txBody>
       </p:sp>
@@ -7550,7 +7550,7 @@
           <a:bodyPr/>
           <a:lstStyle/>
           <a:p>
-            <a:endParaRPr lang="en-US"/>
+            <a:endParaRPr lang="en-US" dirty="0"/>
           </a:p>
         </p:txBody>
       </p:sp>
@@ -7573,14 +7573,14 @@
               <a:rPr lang="en-US" smtClean="0"/>
               <a:t>‹#›</a:t>
             </a:fld>
-            <a:endParaRPr lang="en-US"/>
+            <a:endParaRPr lang="en-US" dirty="0"/>
           </a:p>
         </p:txBody>
       </p:sp>
     </p:spTree>
     <p:extLst>
       <p:ext uri="{BB962C8B-B14F-4D97-AF65-F5344CB8AC3E}">
-        <p14:creationId xmlns:p14="http://schemas.microsoft.com/office/powerpoint/2010/main" val="417508973"/>
+        <p14:creationId xmlns:p14="http://schemas.microsoft.com/office/powerpoint/2010/main" val="2533873230"/>
       </p:ext>
     </p:extLst>
   </p:cSld>
@@ -7779,9 +7779,9 @@
           <a:p>
             <a:fld id="{E0C5E198-763C-4A3F-B341-641177DB07D5}" type="datetimeFigureOut">
               <a:rPr lang="en-US" smtClean="0"/>
-              <a:t>2/22/2026</a:t>
+              <a:t>2/24/2026</a:t>
             </a:fld>
-            <a:endParaRPr lang="en-US"/>
+            <a:endParaRPr lang="en-US" dirty="0"/>
           </a:p>
         </p:txBody>
       </p:sp>
@@ -7800,7 +7800,7 @@
           <a:bodyPr/>
           <a:lstStyle/>
           <a:p>
-            <a:endParaRPr lang="en-US"/>
+            <a:endParaRPr lang="en-US" dirty="0"/>
           </a:p>
         </p:txBody>
       </p:sp>
@@ -7823,14 +7823,14 @@
               <a:rPr lang="en-US" smtClean="0"/>
               <a:t>‹#›</a:t>
             </a:fld>
-            <a:endParaRPr lang="en-US"/>
+            <a:endParaRPr lang="en-US" dirty="0"/>
           </a:p>
         </p:txBody>
       </p:sp>
     </p:spTree>
     <p:extLst>
       <p:ext uri="{BB962C8B-B14F-4D97-AF65-F5344CB8AC3E}">
-        <p14:creationId xmlns:p14="http://schemas.microsoft.com/office/powerpoint/2010/main" val="1291155094"/>
+        <p14:creationId xmlns:p14="http://schemas.microsoft.com/office/powerpoint/2010/main" val="1223131802"/>
       </p:ext>
     </p:extLst>
   </p:cSld>
@@ -8011,9 +8011,9 @@
           <a:p>
             <a:fld id="{E0C5E198-763C-4A3F-B341-641177DB07D5}" type="datetimeFigureOut">
               <a:rPr lang="en-US" smtClean="0"/>
-              <a:t>2/22/2026</a:t>
+              <a:t>2/24/2026</a:t>
             </a:fld>
-            <a:endParaRPr lang="en-US"/>
+            <a:endParaRPr lang="en-US" dirty="0"/>
           </a:p>
         </p:txBody>
       </p:sp>
@@ -8032,7 +8032,7 @@
           <a:bodyPr/>
           <a:lstStyle/>
           <a:p>
-            <a:endParaRPr lang="en-US"/>
+            <a:endParaRPr lang="en-US" dirty="0"/>
           </a:p>
         </p:txBody>
       </p:sp>
@@ -8055,14 +8055,14 @@
               <a:rPr lang="en-US" smtClean="0"/>
               <a:t>‹#›</a:t>
             </a:fld>
-            <a:endParaRPr lang="en-US"/>
+            <a:endParaRPr lang="en-US" dirty="0"/>
           </a:p>
         </p:txBody>
       </p:sp>
     </p:spTree>
     <p:extLst>
       <p:ext uri="{BB962C8B-B14F-4D97-AF65-F5344CB8AC3E}">
-        <p14:creationId xmlns:p14="http://schemas.microsoft.com/office/powerpoint/2010/main" val="2734141476"/>
+        <p14:creationId xmlns:p14="http://schemas.microsoft.com/office/powerpoint/2010/main" val="3577025981"/>
       </p:ext>
     </p:extLst>
   </p:cSld>
@@ -8392,9 +8392,9 @@
           <a:p>
             <a:fld id="{E0C5E198-763C-4A3F-B341-641177DB07D5}" type="datetimeFigureOut">
               <a:rPr lang="en-US" smtClean="0"/>
-              <a:t>2/22/2026</a:t>
+              <a:t>2/24/2026</a:t>
             </a:fld>
-            <a:endParaRPr lang="en-US"/>
+            <a:endParaRPr lang="en-US" dirty="0"/>
           </a:p>
         </p:txBody>
       </p:sp>
@@ -8413,7 +8413,7 @@
           <a:bodyPr/>
           <a:lstStyle/>
           <a:p>
-            <a:endParaRPr lang="en-US"/>
+            <a:endParaRPr lang="en-US" dirty="0"/>
           </a:p>
         </p:txBody>
       </p:sp>
@@ -8436,14 +8436,14 @@
               <a:rPr lang="en-US" smtClean="0"/>
               <a:t>‹#›</a:t>
             </a:fld>
-            <a:endParaRPr lang="en-US"/>
+            <a:endParaRPr lang="en-US" dirty="0"/>
           </a:p>
         </p:txBody>
       </p:sp>
     </p:spTree>
     <p:extLst>
       <p:ext uri="{BB962C8B-B14F-4D97-AF65-F5344CB8AC3E}">
-        <p14:creationId xmlns:p14="http://schemas.microsoft.com/office/powerpoint/2010/main" val="197682429"/>
+        <p14:creationId xmlns:p14="http://schemas.microsoft.com/office/powerpoint/2010/main" val="78564932"/>
       </p:ext>
     </p:extLst>
   </p:cSld>
@@ -8510,9 +8510,9 @@
           <a:p>
             <a:fld id="{E0C5E198-763C-4A3F-B341-641177DB07D5}" type="datetimeFigureOut">
               <a:rPr lang="en-US" smtClean="0"/>
-              <a:t>2/22/2026</a:t>
+              <a:t>2/24/2026</a:t>
             </a:fld>
-            <a:endParaRPr lang="en-US"/>
+            <a:endParaRPr lang="en-US" dirty="0"/>
           </a:p>
         </p:txBody>
       </p:sp>
@@ -8531,7 +8531,7 @@
           <a:bodyPr/>
           <a:lstStyle/>
           <a:p>
-            <a:endParaRPr lang="en-US"/>
+            <a:endParaRPr lang="en-US" dirty="0"/>
           </a:p>
         </p:txBody>
       </p:sp>
@@ -8554,14 +8554,14 @@
               <a:rPr lang="en-US" smtClean="0"/>
               <a:t>‹#›</a:t>
             </a:fld>
-            <a:endParaRPr lang="en-US"/>
+            <a:endParaRPr lang="en-US" dirty="0"/>
           </a:p>
         </p:txBody>
       </p:sp>
     </p:spTree>
     <p:extLst>
       <p:ext uri="{BB962C8B-B14F-4D97-AF65-F5344CB8AC3E}">
-        <p14:creationId xmlns:p14="http://schemas.microsoft.com/office/powerpoint/2010/main" val="2675180761"/>
+        <p14:creationId xmlns:p14="http://schemas.microsoft.com/office/powerpoint/2010/main" val="3403062667"/>
       </p:ext>
     </p:extLst>
   </p:cSld>
@@ -8605,9 +8605,9 @@
           <a:p>
             <a:fld id="{E0C5E198-763C-4A3F-B341-641177DB07D5}" type="datetimeFigureOut">
               <a:rPr lang="en-US" smtClean="0"/>
-              <a:t>2/22/2026</a:t>
+              <a:t>2/24/2026</a:t>
             </a:fld>
-            <a:endParaRPr lang="en-US"/>
+            <a:endParaRPr lang="en-US" dirty="0"/>
           </a:p>
         </p:txBody>
       </p:sp>
@@ -8626,7 +8626,7 @@
           <a:bodyPr/>
           <a:lstStyle/>
           <a:p>
-            <a:endParaRPr lang="en-US"/>
+            <a:endParaRPr lang="en-US" dirty="0"/>
           </a:p>
         </p:txBody>
       </p:sp>
@@ -8649,14 +8649,14 @@
               <a:rPr lang="en-US" smtClean="0"/>
               <a:t>‹#›</a:t>
             </a:fld>
-            <a:endParaRPr lang="en-US"/>
+            <a:endParaRPr lang="en-US" dirty="0"/>
           </a:p>
         </p:txBody>
       </p:sp>
     </p:spTree>
     <p:extLst>
       <p:ext uri="{BB962C8B-B14F-4D97-AF65-F5344CB8AC3E}">
-        <p14:creationId xmlns:p14="http://schemas.microsoft.com/office/powerpoint/2010/main" val="4061889277"/>
+        <p14:creationId xmlns:p14="http://schemas.microsoft.com/office/powerpoint/2010/main" val="4212348913"/>
       </p:ext>
     </p:extLst>
   </p:cSld>
@@ -8854,9 +8854,9 @@
           <a:p>
             <a:fld id="{E0C5E198-763C-4A3F-B341-641177DB07D5}" type="datetimeFigureOut">
               <a:rPr lang="en-US" smtClean="0"/>
-              <a:t>2/22/2026</a:t>
+              <a:t>2/24/2026</a:t>
             </a:fld>
-            <a:endParaRPr lang="en-US"/>
+            <a:endParaRPr lang="en-US" dirty="0"/>
           </a:p>
         </p:txBody>
       </p:sp>
@@ -8875,7 +8875,7 @@
           <a:bodyPr/>
           <a:lstStyle/>
           <a:p>
-            <a:endParaRPr lang="en-US"/>
+            <a:endParaRPr lang="en-US" dirty="0"/>
           </a:p>
         </p:txBody>
       </p:sp>
@@ -8898,14 +8898,14 @@
               <a:rPr lang="en-US" smtClean="0"/>
               <a:t>‹#›</a:t>
             </a:fld>
-            <a:endParaRPr lang="en-US"/>
+            <a:endParaRPr lang="en-US" dirty="0"/>
           </a:p>
         </p:txBody>
       </p:sp>
     </p:spTree>
     <p:extLst>
       <p:ext uri="{BB962C8B-B14F-4D97-AF65-F5344CB8AC3E}">
-        <p14:creationId xmlns:p14="http://schemas.microsoft.com/office/powerpoint/2010/main" val="2453799385"/>
+        <p14:creationId xmlns:p14="http://schemas.microsoft.com/office/powerpoint/2010/main" val="3427275237"/>
       </p:ext>
     </p:extLst>
   </p:cSld>
@@ -9134,9 +9134,9 @@
           <a:p>
             <a:fld id="{E0C5E198-763C-4A3F-B341-641177DB07D5}" type="datetimeFigureOut">
               <a:rPr lang="en-US" smtClean="0"/>
-              <a:t>2/22/2026</a:t>
+              <a:t>2/24/2026</a:t>
             </a:fld>
-            <a:endParaRPr lang="en-US"/>
+            <a:endParaRPr lang="en-US" dirty="0"/>
           </a:p>
         </p:txBody>
       </p:sp>
@@ -9155,7 +9155,7 @@
           <a:bodyPr/>
           <a:lstStyle/>
           <a:p>
-            <a:endParaRPr lang="en-US"/>
+            <a:endParaRPr lang="en-US" dirty="0"/>
           </a:p>
         </p:txBody>
       </p:sp>
@@ -9178,14 +9178,14 @@
               <a:rPr lang="en-US" smtClean="0"/>
               <a:t>‹#›</a:t>
             </a:fld>
-            <a:endParaRPr lang="en-US"/>
+            <a:endParaRPr lang="en-US" dirty="0"/>
           </a:p>
         </p:txBody>
       </p:sp>
     </p:spTree>
     <p:extLst>
       <p:ext uri="{BB962C8B-B14F-4D97-AF65-F5344CB8AC3E}">
-        <p14:creationId xmlns:p14="http://schemas.microsoft.com/office/powerpoint/2010/main" val="1205217522"/>
+        <p14:creationId xmlns:p14="http://schemas.microsoft.com/office/powerpoint/2010/main" val="1912270558"/>
       </p:ext>
     </p:extLst>
   </p:cSld>
@@ -9250,7 +9250,7 @@
           <a:noFill/>
           <a:extLst>
             <a:ext uri="{909E8E84-426E-40dd-AFC4-6F175D3DCCD1}">
-              <a14:hiddenFill xmlns="" xmlns:a14="http://schemas.microsoft.com/office/drawing/2010/main">
+              <a14:hiddenFill xmlns:a14="http://schemas.microsoft.com/office/drawing/2010/main" xmlns="">
                 <a:solidFill>
                   <a:srgbClr val="FFFFFF"/>
                 </a:solidFill>
@@ -9324,7 +9324,7 @@
               </a:ln>
               <a:extLst>
                 <a:ext uri="{91240B29-F687-4f45-9708-019B960494DF}">
-                  <a14:hiddenLine xmlns="" xmlns:a14="http://schemas.microsoft.com/office/drawing/2010/main" w="9525">
+                  <a14:hiddenLine xmlns:a14="http://schemas.microsoft.com/office/drawing/2010/main" xmlns="" w="9525">
                     <a:solidFill>
                       <a:srgbClr val="000000"/>
                     </a:solidFill>
@@ -9414,7 +9414,7 @@
               </a:ln>
               <a:extLst>
                 <a:ext uri="{91240B29-F687-4f45-9708-019B960494DF}">
-                  <a14:hiddenLine xmlns="" xmlns:a14="http://schemas.microsoft.com/office/drawing/2010/main" w="9525">
+                  <a14:hiddenLine xmlns:a14="http://schemas.microsoft.com/office/drawing/2010/main" xmlns="" w="9525">
                     <a:solidFill>
                       <a:srgbClr val="000000"/>
                     </a:solidFill>
@@ -9504,7 +9504,7 @@
               </a:ln>
               <a:extLst>
                 <a:ext uri="{91240B29-F687-4f45-9708-019B960494DF}">
-                  <a14:hiddenLine xmlns="" xmlns:a14="http://schemas.microsoft.com/office/drawing/2010/main" w="9525">
+                  <a14:hiddenLine xmlns:a14="http://schemas.microsoft.com/office/drawing/2010/main" xmlns="" w="9525">
                     <a:solidFill>
                       <a:srgbClr val="000000"/>
                     </a:solidFill>
@@ -9566,7 +9566,7 @@
               </a:ln>
               <a:extLst>
                 <a:ext uri="{91240B29-F687-4f45-9708-019B960494DF}">
-                  <a14:hiddenLine xmlns="" xmlns:a14="http://schemas.microsoft.com/office/drawing/2010/main" w="9525">
+                  <a14:hiddenLine xmlns:a14="http://schemas.microsoft.com/office/drawing/2010/main" xmlns="" w="9525">
                     <a:solidFill>
                       <a:srgbClr val="000000"/>
                     </a:solidFill>
@@ -9656,7 +9656,7 @@
               </a:ln>
               <a:extLst>
                 <a:ext uri="{91240B29-F687-4f45-9708-019B960494DF}">
-                  <a14:hiddenLine xmlns="" xmlns:a14="http://schemas.microsoft.com/office/drawing/2010/main" w="9525">
+                  <a14:hiddenLine xmlns:a14="http://schemas.microsoft.com/office/drawing/2010/main" xmlns="" w="9525">
                     <a:solidFill>
                       <a:srgbClr val="000000"/>
                     </a:solidFill>
@@ -9718,7 +9718,7 @@
               </a:ln>
               <a:extLst>
                 <a:ext uri="{91240B29-F687-4f45-9708-019B960494DF}">
-                  <a14:hiddenLine xmlns="" xmlns:a14="http://schemas.microsoft.com/office/drawing/2010/main" w="9525">
+                  <a14:hiddenLine xmlns:a14="http://schemas.microsoft.com/office/drawing/2010/main" xmlns="" w="9525">
                     <a:solidFill>
                       <a:srgbClr val="000000"/>
                     </a:solidFill>
@@ -9780,7 +9780,7 @@
               </a:ln>
               <a:extLst>
                 <a:ext uri="{91240B29-F687-4f45-9708-019B960494DF}">
-                  <a14:hiddenLine xmlns="" xmlns:a14="http://schemas.microsoft.com/office/drawing/2010/main" w="9525">
+                  <a14:hiddenLine xmlns:a14="http://schemas.microsoft.com/office/drawing/2010/main" xmlns="" w="9525">
                     <a:solidFill>
                       <a:srgbClr val="000000"/>
                     </a:solidFill>
@@ -9870,7 +9870,7 @@
               </a:ln>
               <a:extLst>
                 <a:ext uri="{91240B29-F687-4f45-9708-019B960494DF}">
-                  <a14:hiddenLine xmlns="" xmlns:a14="http://schemas.microsoft.com/office/drawing/2010/main" w="9525">
+                  <a14:hiddenLine xmlns:a14="http://schemas.microsoft.com/office/drawing/2010/main" xmlns="" w="9525">
                     <a:solidFill>
                       <a:srgbClr val="000000"/>
                     </a:solidFill>
@@ -9960,7 +9960,7 @@
               </a:ln>
               <a:extLst>
                 <a:ext uri="{91240B29-F687-4f45-9708-019B960494DF}">
-                  <a14:hiddenLine xmlns="" xmlns:a14="http://schemas.microsoft.com/office/drawing/2010/main" w="9525">
+                  <a14:hiddenLine xmlns:a14="http://schemas.microsoft.com/office/drawing/2010/main" xmlns="" w="9525">
                     <a:solidFill>
                       <a:srgbClr val="000000"/>
                     </a:solidFill>
@@ -10022,7 +10022,7 @@
               </a:ln>
               <a:extLst>
                 <a:ext uri="{91240B29-F687-4f45-9708-019B960494DF}">
-                  <a14:hiddenLine xmlns="" xmlns:a14="http://schemas.microsoft.com/office/drawing/2010/main" w="9525">
+                  <a14:hiddenLine xmlns:a14="http://schemas.microsoft.com/office/drawing/2010/main" xmlns="" w="9525">
                     <a:solidFill>
                       <a:srgbClr val="000000"/>
                     </a:solidFill>
@@ -10132,7 +10132,7 @@
               </a:ln>
               <a:extLst>
                 <a:ext uri="{91240B29-F687-4f45-9708-019B960494DF}">
-                  <a14:hiddenLine xmlns="" xmlns:a14="http://schemas.microsoft.com/office/drawing/2010/main" w="9525">
+                  <a14:hiddenLine xmlns:a14="http://schemas.microsoft.com/office/drawing/2010/main" xmlns="" w="9525">
                     <a:solidFill>
                       <a:srgbClr val="000000"/>
                     </a:solidFill>
@@ -10216,7 +10216,7 @@
               </a:ln>
               <a:extLst>
                 <a:ext uri="{91240B29-F687-4f45-9708-019B960494DF}">
-                  <a14:hiddenLine xmlns="" xmlns:a14="http://schemas.microsoft.com/office/drawing/2010/main" w="9525">
+                  <a14:hiddenLine xmlns:a14="http://schemas.microsoft.com/office/drawing/2010/main" xmlns="" w="9525">
                     <a:solidFill>
                       <a:srgbClr val="000000"/>
                     </a:solidFill>
@@ -10278,7 +10278,7 @@
               </a:ln>
               <a:extLst>
                 <a:ext uri="{91240B29-F687-4f45-9708-019B960494DF}">
-                  <a14:hiddenLine xmlns="" xmlns:a14="http://schemas.microsoft.com/office/drawing/2010/main" w="9525">
+                  <a14:hiddenLine xmlns:a14="http://schemas.microsoft.com/office/drawing/2010/main" xmlns="" w="9525">
                     <a:solidFill>
                       <a:srgbClr val="000000"/>
                     </a:solidFill>
@@ -10340,7 +10340,7 @@
               </a:ln>
               <a:extLst>
                 <a:ext uri="{91240B29-F687-4f45-9708-019B960494DF}">
-                  <a14:hiddenLine xmlns="" xmlns:a14="http://schemas.microsoft.com/office/drawing/2010/main" w="9525">
+                  <a14:hiddenLine xmlns:a14="http://schemas.microsoft.com/office/drawing/2010/main" xmlns="" w="9525">
                     <a:solidFill>
                       <a:srgbClr val="000000"/>
                     </a:solidFill>
@@ -10430,7 +10430,7 @@
               </a:ln>
               <a:extLst>
                 <a:ext uri="{91240B29-F687-4f45-9708-019B960494DF}">
-                  <a14:hiddenLine xmlns="" xmlns:a14="http://schemas.microsoft.com/office/drawing/2010/main" w="9525">
+                  <a14:hiddenLine xmlns:a14="http://schemas.microsoft.com/office/drawing/2010/main" xmlns="" w="9525">
                     <a:solidFill>
                       <a:srgbClr val="000000"/>
                     </a:solidFill>
@@ -10464,7 +10464,7 @@
               </a:ln>
               <a:extLst>
                 <a:ext uri="{91240B29-F687-4f45-9708-019B960494DF}">
-                  <a14:hiddenLine xmlns="" xmlns:a14="http://schemas.microsoft.com/office/drawing/2010/main" w="9525">
+                  <a14:hiddenLine xmlns:a14="http://schemas.microsoft.com/office/drawing/2010/main" xmlns="" w="9525">
                     <a:solidFill>
                       <a:srgbClr val="000000"/>
                     </a:solidFill>
@@ -10529,7 +10529,7 @@
               </a:ln>
               <a:extLst>
                 <a:ext uri="{91240B29-F687-4f45-9708-019B960494DF}">
-                  <a14:hiddenLine xmlns="" xmlns:a14="http://schemas.microsoft.com/office/drawing/2010/main" w="9525">
+                  <a14:hiddenLine xmlns:a14="http://schemas.microsoft.com/office/drawing/2010/main" xmlns="" w="9525">
                     <a:solidFill>
                       <a:srgbClr val="000000"/>
                     </a:solidFill>
@@ -10619,7 +10619,7 @@
               </a:ln>
               <a:extLst>
                 <a:ext uri="{91240B29-F687-4f45-9708-019B960494DF}">
-                  <a14:hiddenLine xmlns="" xmlns:a14="http://schemas.microsoft.com/office/drawing/2010/main" w="9525">
+                  <a14:hiddenLine xmlns:a14="http://schemas.microsoft.com/office/drawing/2010/main" xmlns="" w="9525">
                     <a:solidFill>
                       <a:srgbClr val="000000"/>
                     </a:solidFill>
@@ -10681,7 +10681,7 @@
               </a:ln>
               <a:extLst>
                 <a:ext uri="{91240B29-F687-4f45-9708-019B960494DF}">
-                  <a14:hiddenLine xmlns="" xmlns:a14="http://schemas.microsoft.com/office/drawing/2010/main" w="9525">
+                  <a14:hiddenLine xmlns:a14="http://schemas.microsoft.com/office/drawing/2010/main" xmlns="" w="9525">
                     <a:solidFill>
                       <a:srgbClr val="000000"/>
                     </a:solidFill>
@@ -10771,7 +10771,7 @@
               </a:ln>
               <a:extLst>
                 <a:ext uri="{91240B29-F687-4f45-9708-019B960494DF}">
-                  <a14:hiddenLine xmlns="" xmlns:a14="http://schemas.microsoft.com/office/drawing/2010/main" w="9525">
+                  <a14:hiddenLine xmlns:a14="http://schemas.microsoft.com/office/drawing/2010/main" xmlns="" w="9525">
                     <a:solidFill>
                       <a:srgbClr val="000000"/>
                     </a:solidFill>
@@ -10836,7 +10836,7 @@
               </a:ln>
               <a:extLst>
                 <a:ext uri="{91240B29-F687-4f45-9708-019B960494DF}">
-                  <a14:hiddenLine xmlns="" xmlns:a14="http://schemas.microsoft.com/office/drawing/2010/main" w="9525">
+                  <a14:hiddenLine xmlns:a14="http://schemas.microsoft.com/office/drawing/2010/main" xmlns="" w="9525">
                     <a:solidFill>
                       <a:srgbClr val="000000"/>
                     </a:solidFill>
@@ -10898,7 +10898,7 @@
               </a:ln>
               <a:extLst>
                 <a:ext uri="{91240B29-F687-4f45-9708-019B960494DF}">
-                  <a14:hiddenLine xmlns="" xmlns:a14="http://schemas.microsoft.com/office/drawing/2010/main" w="9525">
+                  <a14:hiddenLine xmlns:a14="http://schemas.microsoft.com/office/drawing/2010/main" xmlns="" w="9525">
                     <a:solidFill>
                       <a:srgbClr val="000000"/>
                     </a:solidFill>
@@ -10988,7 +10988,7 @@
               </a:ln>
               <a:extLst>
                 <a:ext uri="{91240B29-F687-4f45-9708-019B960494DF}">
-                  <a14:hiddenLine xmlns="" xmlns:a14="http://schemas.microsoft.com/office/drawing/2010/main" w="9525">
+                  <a14:hiddenLine xmlns:a14="http://schemas.microsoft.com/office/drawing/2010/main" xmlns="" w="9525">
                     <a:solidFill>
                       <a:srgbClr val="000000"/>
                     </a:solidFill>
@@ -11078,7 +11078,7 @@
               </a:ln>
               <a:extLst>
                 <a:ext uri="{91240B29-F687-4f45-9708-019B960494DF}">
-                  <a14:hiddenLine xmlns="" xmlns:a14="http://schemas.microsoft.com/office/drawing/2010/main" w="9525">
+                  <a14:hiddenLine xmlns:a14="http://schemas.microsoft.com/office/drawing/2010/main" xmlns="" w="9525">
                     <a:solidFill>
                       <a:srgbClr val="000000"/>
                     </a:solidFill>
@@ -11143,7 +11143,7 @@
               </a:ln>
               <a:extLst>
                 <a:ext uri="{91240B29-F687-4f45-9708-019B960494DF}">
-                  <a14:hiddenLine xmlns="" xmlns:a14="http://schemas.microsoft.com/office/drawing/2010/main" w="9525">
+                  <a14:hiddenLine xmlns:a14="http://schemas.microsoft.com/office/drawing/2010/main" xmlns="" w="9525">
                     <a:solidFill>
                       <a:srgbClr val="000000"/>
                     </a:solidFill>
@@ -11263,7 +11263,7 @@
               </a:ln>
               <a:extLst>
                 <a:ext uri="{91240B29-F687-4f45-9708-019B960494DF}">
-                  <a14:hiddenLine xmlns="" xmlns:a14="http://schemas.microsoft.com/office/drawing/2010/main" w="9525">
+                  <a14:hiddenLine xmlns:a14="http://schemas.microsoft.com/office/drawing/2010/main" xmlns="" w="9525">
                     <a:solidFill>
                       <a:srgbClr val="000000"/>
                     </a:solidFill>
@@ -11361,7 +11361,7 @@
               </a:ln>
               <a:extLst>
                 <a:ext uri="{91240B29-F687-4f45-9708-019B960494DF}">
-                  <a14:hiddenLine xmlns="" xmlns:a14="http://schemas.microsoft.com/office/drawing/2010/main" w="9525">
+                  <a14:hiddenLine xmlns:a14="http://schemas.microsoft.com/office/drawing/2010/main" xmlns="" w="9525">
                     <a:solidFill>
                       <a:srgbClr val="000000"/>
                     </a:solidFill>
@@ -11476,7 +11476,7 @@
               </a:ln>
               <a:extLst>
                 <a:ext uri="{91240B29-F687-4f45-9708-019B960494DF}">
-                  <a14:hiddenLine xmlns="" xmlns:a14="http://schemas.microsoft.com/office/drawing/2010/main" w="9525">
+                  <a14:hiddenLine xmlns:a14="http://schemas.microsoft.com/office/drawing/2010/main" xmlns="" w="9525">
                     <a:solidFill>
                       <a:srgbClr val="000000"/>
                     </a:solidFill>
@@ -11566,7 +11566,7 @@
               </a:ln>
               <a:extLst>
                 <a:ext uri="{91240B29-F687-4f45-9708-019B960494DF}">
-                  <a14:hiddenLine xmlns="" xmlns:a14="http://schemas.microsoft.com/office/drawing/2010/main" w="9525">
+                  <a14:hiddenLine xmlns:a14="http://schemas.microsoft.com/office/drawing/2010/main" xmlns="" w="9525">
                     <a:solidFill>
                       <a:srgbClr val="000000"/>
                     </a:solidFill>
@@ -11631,7 +11631,7 @@
               </a:ln>
               <a:extLst>
                 <a:ext uri="{91240B29-F687-4f45-9708-019B960494DF}">
-                  <a14:hiddenLine xmlns="" xmlns:a14="http://schemas.microsoft.com/office/drawing/2010/main" w="9525">
+                  <a14:hiddenLine xmlns:a14="http://schemas.microsoft.com/office/drawing/2010/main" xmlns="" w="9525">
                     <a:solidFill>
                       <a:srgbClr val="000000"/>
                     </a:solidFill>
@@ -11721,7 +11721,7 @@
               </a:ln>
               <a:extLst>
                 <a:ext uri="{91240B29-F687-4f45-9708-019B960494DF}">
-                  <a14:hiddenLine xmlns="" xmlns:a14="http://schemas.microsoft.com/office/drawing/2010/main" w="9525">
+                  <a14:hiddenLine xmlns:a14="http://schemas.microsoft.com/office/drawing/2010/main" xmlns="" w="9525">
                     <a:solidFill>
                       <a:srgbClr val="000000"/>
                     </a:solidFill>
@@ -11789,7 +11789,7 @@
               </a:ln>
               <a:extLst>
                 <a:ext uri="{91240B29-F687-4f45-9708-019B960494DF}">
-                  <a14:hiddenLine xmlns="" xmlns:a14="http://schemas.microsoft.com/office/drawing/2010/main" w="9525">
+                  <a14:hiddenLine xmlns:a14="http://schemas.microsoft.com/office/drawing/2010/main" xmlns="" w="9525">
                     <a:solidFill>
                       <a:srgbClr val="000000"/>
                     </a:solidFill>
@@ -11879,7 +11879,7 @@
               </a:ln>
               <a:extLst>
                 <a:ext uri="{91240B29-F687-4f45-9708-019B960494DF}">
-                  <a14:hiddenLine xmlns="" xmlns:a14="http://schemas.microsoft.com/office/drawing/2010/main" w="9525">
+                  <a14:hiddenLine xmlns:a14="http://schemas.microsoft.com/office/drawing/2010/main" xmlns="" w="9525">
                     <a:solidFill>
                       <a:srgbClr val="000000"/>
                     </a:solidFill>
@@ -11947,7 +11947,7 @@
               </a:ln>
               <a:extLst>
                 <a:ext uri="{91240B29-F687-4f45-9708-019B960494DF}">
-                  <a14:hiddenLine xmlns="" xmlns:a14="http://schemas.microsoft.com/office/drawing/2010/main" w="9525">
+                  <a14:hiddenLine xmlns:a14="http://schemas.microsoft.com/office/drawing/2010/main" xmlns="" w="9525">
                     <a:solidFill>
                       <a:srgbClr val="000000"/>
                     </a:solidFill>
@@ -12037,7 +12037,7 @@
               </a:ln>
               <a:extLst>
                 <a:ext uri="{91240B29-F687-4f45-9708-019B960494DF}">
-                  <a14:hiddenLine xmlns="" xmlns:a14="http://schemas.microsoft.com/office/drawing/2010/main" w="9525">
+                  <a14:hiddenLine xmlns:a14="http://schemas.microsoft.com/office/drawing/2010/main" xmlns="" w="9525">
                     <a:solidFill>
                       <a:srgbClr val="000000"/>
                     </a:solidFill>
@@ -12071,7 +12071,7 @@
               </a:ln>
               <a:extLst>
                 <a:ext uri="{91240B29-F687-4f45-9708-019B960494DF}">
-                  <a14:hiddenLine xmlns="" xmlns:a14="http://schemas.microsoft.com/office/drawing/2010/main" w="9525">
+                  <a14:hiddenLine xmlns:a14="http://schemas.microsoft.com/office/drawing/2010/main" xmlns="" w="9525">
                     <a:solidFill>
                       <a:srgbClr val="000000"/>
                     </a:solidFill>
@@ -12211,9 +12211,9 @@
           <a:p>
             <a:fld id="{E0C5E198-763C-4A3F-B341-641177DB07D5}" type="datetimeFigureOut">
               <a:rPr lang="en-US" smtClean="0"/>
-              <a:t>2/22/2026</a:t>
+              <a:t>2/24/2026</a:t>
             </a:fld>
-            <a:endParaRPr lang="en-US"/>
+            <a:endParaRPr lang="en-US" dirty="0"/>
           </a:p>
         </p:txBody>
       </p:sp>
@@ -12250,7 +12250,7 @@
             </a:lvl1pPr>
           </a:lstStyle>
           <a:p>
-            <a:endParaRPr lang="en-US"/>
+            <a:endParaRPr lang="en-US" dirty="0"/>
           </a:p>
         </p:txBody>
       </p:sp>
@@ -12291,36 +12291,36 @@
               <a:rPr lang="en-US" smtClean="0"/>
               <a:t>‹#›</a:t>
             </a:fld>
-            <a:endParaRPr lang="en-US"/>
+            <a:endParaRPr lang="en-US" dirty="0"/>
           </a:p>
         </p:txBody>
       </p:sp>
     </p:spTree>
     <p:extLst>
       <p:ext uri="{BB962C8B-B14F-4D97-AF65-F5344CB8AC3E}">
-        <p14:creationId xmlns:p14="http://schemas.microsoft.com/office/powerpoint/2010/main" val="373494271"/>
+        <p14:creationId xmlns:p14="http://schemas.microsoft.com/office/powerpoint/2010/main" val="3216684115"/>
       </p:ext>
     </p:extLst>
   </p:cSld>
   <p:clrMap bg1="dk1" tx1="lt1" bg2="dk2" tx2="lt2" accent1="accent1" accent2="accent2" accent3="accent3" accent4="accent4" accent5="accent5" accent6="accent6" hlink="hlink" folHlink="folHlink"/>
   <p:sldLayoutIdLst>
-    <p:sldLayoutId id="2147483874" r:id="rId1"/>
-    <p:sldLayoutId id="2147483875" r:id="rId2"/>
-    <p:sldLayoutId id="2147483876" r:id="rId3"/>
-    <p:sldLayoutId id="2147483877" r:id="rId4"/>
-    <p:sldLayoutId id="2147483878" r:id="rId5"/>
-    <p:sldLayoutId id="2147483879" r:id="rId6"/>
-    <p:sldLayoutId id="2147483880" r:id="rId7"/>
-    <p:sldLayoutId id="2147483881" r:id="rId8"/>
-    <p:sldLayoutId id="2147483882" r:id="rId9"/>
-    <p:sldLayoutId id="2147483883" r:id="rId10"/>
-    <p:sldLayoutId id="2147483884" r:id="rId11"/>
-    <p:sldLayoutId id="2147483885" r:id="rId12"/>
-    <p:sldLayoutId id="2147483886" r:id="rId13"/>
-    <p:sldLayoutId id="2147483887" r:id="rId14"/>
-    <p:sldLayoutId id="2147483888" r:id="rId15"/>
-    <p:sldLayoutId id="2147483889" r:id="rId16"/>
-    <p:sldLayoutId id="2147483890" r:id="rId17"/>
+    <p:sldLayoutId id="2147483909" r:id="rId1"/>
+    <p:sldLayoutId id="2147483910" r:id="rId2"/>
+    <p:sldLayoutId id="2147483911" r:id="rId3"/>
+    <p:sldLayoutId id="2147483912" r:id="rId4"/>
+    <p:sldLayoutId id="2147483913" r:id="rId5"/>
+    <p:sldLayoutId id="2147483914" r:id="rId6"/>
+    <p:sldLayoutId id="2147483915" r:id="rId7"/>
+    <p:sldLayoutId id="2147483916" r:id="rId8"/>
+    <p:sldLayoutId id="2147483917" r:id="rId9"/>
+    <p:sldLayoutId id="2147483918" r:id="rId10"/>
+    <p:sldLayoutId id="2147483919" r:id="rId11"/>
+    <p:sldLayoutId id="2147483920" r:id="rId12"/>
+    <p:sldLayoutId id="2147483921" r:id="rId13"/>
+    <p:sldLayoutId id="2147483922" r:id="rId14"/>
+    <p:sldLayoutId id="2147483923" r:id="rId15"/>
+    <p:sldLayoutId id="2147483924" r:id="rId16"/>
+    <p:sldLayoutId id="2147483925" r:id="rId17"/>
   </p:sldLayoutIdLst>
   <p:txStyles>
     <p:titleStyle>
@@ -12660,7 +12660,7 @@
           <a:lstStyle/>
           <a:p>
             <a:r>
-              <a:rPr lang="en-US" sz="3200" dirty="0"/>
+              <a:rPr lang="en-US" sz="4400" dirty="0"/>
               <a:t>{{title}}</a:t>
             </a:r>
           </a:p>
@@ -12684,11 +12684,13 @@
         </p:nvSpPr>
         <p:spPr/>
         <p:txBody>
-          <a:bodyPr/>
+          <a:bodyPr>
+            <a:normAutofit/>
+          </a:bodyPr>
           <a:lstStyle/>
           <a:p>
             <a:r>
-              <a:rPr lang="en-US" dirty="0"/>
+              <a:rPr lang="en-US" sz="2800" dirty="0"/>
               <a:t>{{subtitle}}</a:t>
             </a:r>
           </a:p>
@@ -12839,8 +12841,8 @@
         </p:nvSpPr>
         <p:spPr>
           <a:xfrm>
-            <a:off x="1463040" y="618309"/>
-            <a:ext cx="9144000" cy="731928"/>
+            <a:off x="1175657" y="792480"/>
+            <a:ext cx="10546080" cy="853439"/>
           </a:xfrm>
         </p:spPr>
         <p:txBody>
@@ -12850,7 +12852,7 @@
           <a:lstStyle/>
           <a:p>
             <a:r>
-              <a:rPr lang="en-US" sz="4000" dirty="0"/>
+              <a:rPr lang="en-US" sz="5400" dirty="0"/>
               <a:t>{{title}}</a:t>
             </a:r>
           </a:p>
@@ -12874,16 +12876,18 @@
         </p:nvSpPr>
         <p:spPr>
           <a:xfrm>
-            <a:off x="2368732" y="1638255"/>
-            <a:ext cx="9144000" cy="4601436"/>
+            <a:off x="2020389" y="1995307"/>
+            <a:ext cx="7950925" cy="4601436"/>
           </a:xfrm>
         </p:spPr>
         <p:txBody>
-          <a:bodyPr/>
+          <a:bodyPr>
+            <a:normAutofit/>
+          </a:bodyPr>
           <a:lstStyle/>
           <a:p>
             <a:r>
-              <a:rPr lang="en-US" dirty="0">
+              <a:rPr lang="en-US" sz="2600" dirty="0">
                 <a:solidFill>
                   <a:schemeClr val="tx1"/>
                 </a:solidFill>
@@ -13022,78 +13026,6 @@
       </p:grpSpPr>
       <p:sp>
         <p:nvSpPr>
-          <p:cNvPr id="2" name="Title 1">
-            <a:extLst>
-              <a:ext uri="{FF2B5EF4-FFF2-40B4-BE49-F238E27FC236}">
-                <a16:creationId xmlns:a16="http://schemas.microsoft.com/office/drawing/2014/main" id="{CE489713-2FC0-164D-152B-44FCB6E28F49}"/>
-              </a:ext>
-            </a:extLst>
-          </p:cNvPr>
-          <p:cNvSpPr>
-            <a:spLocks noGrp="1"/>
-          </p:cNvSpPr>
-          <p:nvPr>
-            <p:ph type="ctrTitle"/>
-          </p:nvPr>
-        </p:nvSpPr>
-        <p:spPr>
-          <a:xfrm>
-            <a:off x="1524000" y="313509"/>
-            <a:ext cx="9144000" cy="731928"/>
-          </a:xfrm>
-        </p:spPr>
-        <p:txBody>
-          <a:bodyPr>
-            <a:normAutofit/>
-          </a:bodyPr>
-          <a:lstStyle/>
-          <a:p>
-            <a:r>
-              <a:rPr lang="en-US" sz="4000" dirty="0"/>
-              <a:t>{{title}}</a:t>
-            </a:r>
-          </a:p>
-        </p:txBody>
-      </p:sp>
-      <p:sp>
-        <p:nvSpPr>
-          <p:cNvPr id="3" name="Subtitle 2">
-            <a:extLst>
-              <a:ext uri="{FF2B5EF4-FFF2-40B4-BE49-F238E27FC236}">
-                <a16:creationId xmlns:a16="http://schemas.microsoft.com/office/drawing/2014/main" id="{C0C4B04F-C8A9-0D58-A02E-B1C288B5A3BE}"/>
-              </a:ext>
-            </a:extLst>
-          </p:cNvPr>
-          <p:cNvSpPr>
-            <a:spLocks noGrp="1"/>
-          </p:cNvSpPr>
-          <p:nvPr>
-            <p:ph type="subTitle" idx="1"/>
-          </p:nvPr>
-        </p:nvSpPr>
-        <p:spPr>
-          <a:xfrm>
-            <a:off x="1271451" y="1773238"/>
-            <a:ext cx="3108960" cy="4601436"/>
-          </a:xfrm>
-        </p:spPr>
-        <p:txBody>
-          <a:bodyPr/>
-          <a:lstStyle/>
-          <a:p>
-            <a:r>
-              <a:rPr lang="en-US" dirty="0">
-                <a:solidFill>
-                  <a:schemeClr val="tx1"/>
-                </a:solidFill>
-              </a:rPr>
-              <a:t>{{col1}}</a:t>
-            </a:r>
-          </a:p>
-        </p:txBody>
-      </p:sp>
-      <p:sp>
-        <p:nvSpPr>
           <p:cNvPr id="4" name="Subtitle 2">
             <a:extLst>
               <a:ext uri="{FF2B5EF4-FFF2-40B4-BE49-F238E27FC236}">
@@ -13108,7 +13040,7 @@
         </p:nvSpPr>
         <p:spPr>
           <a:xfrm>
-            <a:off x="4924697" y="1773238"/>
+            <a:off x="4924697" y="1916930"/>
             <a:ext cx="3108960" cy="4601436"/>
           </a:xfrm>
           <a:prstGeom prst="rect">
@@ -13285,7 +13217,7 @@
           </a:lstStyle>
           <a:p>
             <a:r>
-              <a:rPr lang="en-US" dirty="0"/>
+              <a:rPr lang="en-US" sz="2600" dirty="0"/>
               <a:t>{{COL2}}</a:t>
             </a:r>
           </a:p>
@@ -13307,7 +13239,7 @@
         </p:nvSpPr>
         <p:spPr>
           <a:xfrm>
-            <a:off x="8577944" y="1773238"/>
+            <a:off x="8577944" y="1916930"/>
             <a:ext cx="3108960" cy="4601436"/>
           </a:xfrm>
           <a:prstGeom prst="rect">
@@ -13484,13 +13416,263 @@
           </a:lstStyle>
           <a:p>
             <a:r>
-              <a:rPr lang="en-US"/>
-              <a:t>{{COL2</a:t>
+              <a:rPr lang="en-US" sz="2600" dirty="0"/>
+              <a:t>{{COL3}}</a:t>
             </a:r>
+          </a:p>
+        </p:txBody>
+      </p:sp>
+      <p:sp>
+        <p:nvSpPr>
+          <p:cNvPr id="6" name="Subtitle 2">
+            <a:extLst>
+              <a:ext uri="{FF2B5EF4-FFF2-40B4-BE49-F238E27FC236}">
+                <a16:creationId xmlns:a16="http://schemas.microsoft.com/office/drawing/2014/main" id="{FDFE0EF0-55CC-CB9A-07B9-D0765C4A9D18}"/>
+              </a:ext>
+            </a:extLst>
+          </p:cNvPr>
+          <p:cNvSpPr txBox="1">
+            <a:spLocks/>
+          </p:cNvSpPr>
+          <p:nvPr/>
+        </p:nvSpPr>
+        <p:spPr>
+          <a:xfrm>
+            <a:off x="1271450" y="1916930"/>
+            <a:ext cx="3108960" cy="4601436"/>
+          </a:xfrm>
+          <a:prstGeom prst="rect">
+            <a:avLst/>
+          </a:prstGeom>
+        </p:spPr>
+        <p:txBody>
+          <a:bodyPr vert="horz" lIns="91440" tIns="45720" rIns="91440" bIns="45720" rtlCol="0">
+            <a:normAutofit/>
+          </a:bodyPr>
+          <a:lstStyle>
+            <a:lvl1pPr marL="0" indent="0" algn="ctr" defTabSz="914400" rtl="0" eaLnBrk="1" latinLnBrk="0" hangingPunct="1">
+              <a:lnSpc>
+                <a:spcPct val="90000"/>
+              </a:lnSpc>
+              <a:spcBef>
+                <a:spcPts val="1000"/>
+              </a:spcBef>
+              <a:buFont typeface="Arial" panose="020B0604020202020204" pitchFamily="34" charset="0"/>
+              <a:buNone/>
+              <a:defRPr sz="2400" kern="1200">
+                <a:solidFill>
+                  <a:schemeClr val="tx1"/>
+                </a:solidFill>
+                <a:latin typeface="+mn-lt"/>
+                <a:ea typeface="+mn-ea"/>
+                <a:cs typeface="+mn-cs"/>
+              </a:defRPr>
+            </a:lvl1pPr>
+            <a:lvl2pPr marL="457200" indent="0" algn="ctr" defTabSz="914400" rtl="0" eaLnBrk="1" latinLnBrk="0" hangingPunct="1">
+              <a:lnSpc>
+                <a:spcPct val="90000"/>
+              </a:lnSpc>
+              <a:spcBef>
+                <a:spcPts val="500"/>
+              </a:spcBef>
+              <a:buFont typeface="Arial" panose="020B0604020202020204" pitchFamily="34" charset="0"/>
+              <a:buNone/>
+              <a:defRPr sz="2000" kern="1200">
+                <a:solidFill>
+                  <a:schemeClr val="tx1"/>
+                </a:solidFill>
+                <a:latin typeface="+mn-lt"/>
+                <a:ea typeface="+mn-ea"/>
+                <a:cs typeface="+mn-cs"/>
+              </a:defRPr>
+            </a:lvl2pPr>
+            <a:lvl3pPr marL="914400" indent="0" algn="ctr" defTabSz="914400" rtl="0" eaLnBrk="1" latinLnBrk="0" hangingPunct="1">
+              <a:lnSpc>
+                <a:spcPct val="90000"/>
+              </a:lnSpc>
+              <a:spcBef>
+                <a:spcPts val="500"/>
+              </a:spcBef>
+              <a:buFont typeface="Arial" panose="020B0604020202020204" pitchFamily="34" charset="0"/>
+              <a:buNone/>
+              <a:defRPr sz="1800" kern="1200">
+                <a:solidFill>
+                  <a:schemeClr val="tx1"/>
+                </a:solidFill>
+                <a:latin typeface="+mn-lt"/>
+                <a:ea typeface="+mn-ea"/>
+                <a:cs typeface="+mn-cs"/>
+              </a:defRPr>
+            </a:lvl3pPr>
+            <a:lvl4pPr marL="1371600" indent="0" algn="ctr" defTabSz="914400" rtl="0" eaLnBrk="1" latinLnBrk="0" hangingPunct="1">
+              <a:lnSpc>
+                <a:spcPct val="90000"/>
+              </a:lnSpc>
+              <a:spcBef>
+                <a:spcPts val="500"/>
+              </a:spcBef>
+              <a:buFont typeface="Arial" panose="020B0604020202020204" pitchFamily="34" charset="0"/>
+              <a:buNone/>
+              <a:defRPr sz="1600" kern="1200">
+                <a:solidFill>
+                  <a:schemeClr val="tx1"/>
+                </a:solidFill>
+                <a:latin typeface="+mn-lt"/>
+                <a:ea typeface="+mn-ea"/>
+                <a:cs typeface="+mn-cs"/>
+              </a:defRPr>
+            </a:lvl4pPr>
+            <a:lvl5pPr marL="1828800" indent="0" algn="ctr" defTabSz="914400" rtl="0" eaLnBrk="1" latinLnBrk="0" hangingPunct="1">
+              <a:lnSpc>
+                <a:spcPct val="90000"/>
+              </a:lnSpc>
+              <a:spcBef>
+                <a:spcPts val="500"/>
+              </a:spcBef>
+              <a:buFont typeface="Arial" panose="020B0604020202020204" pitchFamily="34" charset="0"/>
+              <a:buNone/>
+              <a:defRPr sz="1600" kern="1200">
+                <a:solidFill>
+                  <a:schemeClr val="tx1"/>
+                </a:solidFill>
+                <a:latin typeface="+mn-lt"/>
+                <a:ea typeface="+mn-ea"/>
+                <a:cs typeface="+mn-cs"/>
+              </a:defRPr>
+            </a:lvl5pPr>
+            <a:lvl6pPr marL="2286000" indent="0" algn="ctr" defTabSz="914400" rtl="0" eaLnBrk="1" latinLnBrk="0" hangingPunct="1">
+              <a:lnSpc>
+                <a:spcPct val="90000"/>
+              </a:lnSpc>
+              <a:spcBef>
+                <a:spcPts val="500"/>
+              </a:spcBef>
+              <a:buFont typeface="Arial" panose="020B0604020202020204" pitchFamily="34" charset="0"/>
+              <a:buNone/>
+              <a:defRPr sz="1600" kern="1200">
+                <a:solidFill>
+                  <a:schemeClr val="tx1"/>
+                </a:solidFill>
+                <a:latin typeface="+mn-lt"/>
+                <a:ea typeface="+mn-ea"/>
+                <a:cs typeface="+mn-cs"/>
+              </a:defRPr>
+            </a:lvl6pPr>
+            <a:lvl7pPr marL="2743200" indent="0" algn="ctr" defTabSz="914400" rtl="0" eaLnBrk="1" latinLnBrk="0" hangingPunct="1">
+              <a:lnSpc>
+                <a:spcPct val="90000"/>
+              </a:lnSpc>
+              <a:spcBef>
+                <a:spcPts val="500"/>
+              </a:spcBef>
+              <a:buFont typeface="Arial" panose="020B0604020202020204" pitchFamily="34" charset="0"/>
+              <a:buNone/>
+              <a:defRPr sz="1600" kern="1200">
+                <a:solidFill>
+                  <a:schemeClr val="tx1"/>
+                </a:solidFill>
+                <a:latin typeface="+mn-lt"/>
+                <a:ea typeface="+mn-ea"/>
+                <a:cs typeface="+mn-cs"/>
+              </a:defRPr>
+            </a:lvl7pPr>
+            <a:lvl8pPr marL="3200400" indent="0" algn="ctr" defTabSz="914400" rtl="0" eaLnBrk="1" latinLnBrk="0" hangingPunct="1">
+              <a:lnSpc>
+                <a:spcPct val="90000"/>
+              </a:lnSpc>
+              <a:spcBef>
+                <a:spcPts val="500"/>
+              </a:spcBef>
+              <a:buFont typeface="Arial" panose="020B0604020202020204" pitchFamily="34" charset="0"/>
+              <a:buNone/>
+              <a:defRPr sz="1600" kern="1200">
+                <a:solidFill>
+                  <a:schemeClr val="tx1"/>
+                </a:solidFill>
+                <a:latin typeface="+mn-lt"/>
+                <a:ea typeface="+mn-ea"/>
+                <a:cs typeface="+mn-cs"/>
+              </a:defRPr>
+            </a:lvl8pPr>
+            <a:lvl9pPr marL="3657600" indent="0" algn="ctr" defTabSz="914400" rtl="0" eaLnBrk="1" latinLnBrk="0" hangingPunct="1">
+              <a:lnSpc>
+                <a:spcPct val="90000"/>
+              </a:lnSpc>
+              <a:spcBef>
+                <a:spcPts val="500"/>
+              </a:spcBef>
+              <a:buFont typeface="Arial" panose="020B0604020202020204" pitchFamily="34" charset="0"/>
+              <a:buNone/>
+              <a:defRPr sz="1600" kern="1200">
+                <a:solidFill>
+                  <a:schemeClr val="tx1"/>
+                </a:solidFill>
+                <a:latin typeface="+mn-lt"/>
+                <a:ea typeface="+mn-ea"/>
+                <a:cs typeface="+mn-cs"/>
+              </a:defRPr>
+            </a:lvl9pPr>
+          </a:lstStyle>
+          <a:p>
             <a:r>
-              <a:rPr lang="en-US" dirty="0"/>
-              <a:t>}}</a:t>
+              <a:rPr lang="en-US" sz="2600" dirty="0"/>
+              <a:t>{{COL1}}</a:t>
             </a:r>
+          </a:p>
+        </p:txBody>
+      </p:sp>
+      <p:sp>
+        <p:nvSpPr>
+          <p:cNvPr id="8" name="Title 1">
+            <a:extLst>
+              <a:ext uri="{FF2B5EF4-FFF2-40B4-BE49-F238E27FC236}">
+                <a16:creationId xmlns:a16="http://schemas.microsoft.com/office/drawing/2014/main" id="{6885149D-D39C-7AFD-2D7A-D50D21C114D1}"/>
+              </a:ext>
+            </a:extLst>
+          </p:cNvPr>
+          <p:cNvSpPr txBox="1">
+            <a:spLocks/>
+          </p:cNvSpPr>
+          <p:nvPr/>
+        </p:nvSpPr>
+        <p:spPr>
+          <a:xfrm>
+            <a:off x="1175657" y="792480"/>
+            <a:ext cx="10546080" cy="853439"/>
+          </a:xfrm>
+          <a:prstGeom prst="rect">
+            <a:avLst/>
+          </a:prstGeom>
+        </p:spPr>
+        <p:txBody>
+          <a:bodyPr vert="horz" lIns="91440" tIns="45720" rIns="91440" bIns="45720" rtlCol="0" anchor="b">
+            <a:normAutofit/>
+          </a:bodyPr>
+          <a:lstStyle>
+            <a:lvl1pPr algn="l" defTabSz="914400" rtl="0" eaLnBrk="1" latinLnBrk="0" hangingPunct="1">
+              <a:lnSpc>
+                <a:spcPct val="90000"/>
+              </a:lnSpc>
+              <a:spcBef>
+                <a:spcPct val="0"/>
+              </a:spcBef>
+              <a:buNone/>
+              <a:defRPr sz="4800" kern="1200" cap="all" baseline="0">
+                <a:solidFill>
+                  <a:schemeClr val="tx1"/>
+                </a:solidFill>
+                <a:latin typeface="+mj-lt"/>
+                <a:ea typeface="+mj-ea"/>
+                <a:cs typeface="+mj-cs"/>
+              </a:defRPr>
+            </a:lvl1pPr>
+          </a:lstStyle>
+          <a:p>
+            <a:r>
+              <a:rPr lang="en-US" sz="5400"/>
+              <a:t>{{title}}</a:t>
+            </a:r>
+            <a:endParaRPr lang="en-US" sz="5400" dirty="0"/>
           </a:p>
         </p:txBody>
       </p:sp>
@@ -13498,6 +13680,370 @@
     <p:extLst>
       <p:ext uri="{BB962C8B-B14F-4D97-AF65-F5344CB8AC3E}">
         <p14:creationId xmlns:p14="http://schemas.microsoft.com/office/powerpoint/2010/main" val="727158526"/>
+      </p:ext>
+    </p:extLst>
+  </p:cSld>
+  <p:clrMapOvr>
+    <a:masterClrMapping/>
+  </p:clrMapOvr>
+  <p:transition spd="slow">
+    <p:wipe/>
+  </p:transition>
+  <p:timing>
+    <p:tnLst>
+      <p:par>
+        <p:cTn id="1" dur="indefinite" restart="never" nodeType="tmRoot">
+          <p:childTnLst>
+            <p:seq concurrent="1" nextAc="seek">
+              <p:cTn id="2" dur="indefinite" nodeType="mainSeq">
+                <p:childTnLst>
+                  <p:par>
+                    <p:cTn id="3" fill="hold">
+                      <p:stCondLst>
+                        <p:cond delay="indefinite"/>
+                      </p:stCondLst>
+                      <p:childTnLst>
+                        <p:par>
+                          <p:cTn id="4" fill="hold">
+                            <p:stCondLst>
+                              <p:cond delay="0"/>
+                            </p:stCondLst>
+                            <p:childTnLst>
+                              <p:par>
+                                <p:cTn id="5" presetID="10" presetClass="entr" presetSubtype="0" fill="hold" grpId="0" nodeType="clickEffect">
+                                  <p:stCondLst>
+                                    <p:cond delay="0"/>
+                                  </p:stCondLst>
+                                  <p:childTnLst>
+                                    <p:set>
+                                      <p:cBhvr>
+                                        <p:cTn id="6" dur="1" fill="hold">
+                                          <p:stCondLst>
+                                            <p:cond delay="0"/>
+                                          </p:stCondLst>
+                                        </p:cTn>
+                                        <p:tgtEl>
+                                          <p:spTgt spid="6"/>
+                                        </p:tgtEl>
+                                        <p:attrNameLst>
+                                          <p:attrName>style.visibility</p:attrName>
+                                        </p:attrNameLst>
+                                      </p:cBhvr>
+                                      <p:to>
+                                        <p:strVal val="visible"/>
+                                      </p:to>
+                                    </p:set>
+                                    <p:animEffect transition="in" filter="fade">
+                                      <p:cBhvr>
+                                        <p:cTn id="7" dur="500"/>
+                                        <p:tgtEl>
+                                          <p:spTgt spid="6"/>
+                                        </p:tgtEl>
+                                      </p:cBhvr>
+                                    </p:animEffect>
+                                  </p:childTnLst>
+                                </p:cTn>
+                              </p:par>
+                            </p:childTnLst>
+                          </p:cTn>
+                        </p:par>
+                      </p:childTnLst>
+                    </p:cTn>
+                  </p:par>
+                  <p:par>
+                    <p:cTn id="8" fill="hold">
+                      <p:stCondLst>
+                        <p:cond delay="indefinite"/>
+                      </p:stCondLst>
+                      <p:childTnLst>
+                        <p:par>
+                          <p:cTn id="9" fill="hold">
+                            <p:stCondLst>
+                              <p:cond delay="0"/>
+                            </p:stCondLst>
+                            <p:childTnLst>
+                              <p:par>
+                                <p:cTn id="10" presetID="10" presetClass="entr" presetSubtype="0" fill="hold" grpId="0" nodeType="clickEffect">
+                                  <p:stCondLst>
+                                    <p:cond delay="0"/>
+                                  </p:stCondLst>
+                                  <p:childTnLst>
+                                    <p:set>
+                                      <p:cBhvr>
+                                        <p:cTn id="11" dur="1" fill="hold">
+                                          <p:stCondLst>
+                                            <p:cond delay="0"/>
+                                          </p:stCondLst>
+                                        </p:cTn>
+                                        <p:tgtEl>
+                                          <p:spTgt spid="4"/>
+                                        </p:tgtEl>
+                                        <p:attrNameLst>
+                                          <p:attrName>style.visibility</p:attrName>
+                                        </p:attrNameLst>
+                                      </p:cBhvr>
+                                      <p:to>
+                                        <p:strVal val="visible"/>
+                                      </p:to>
+                                    </p:set>
+                                    <p:animEffect transition="in" filter="fade">
+                                      <p:cBhvr>
+                                        <p:cTn id="12" dur="500"/>
+                                        <p:tgtEl>
+                                          <p:spTgt spid="4"/>
+                                        </p:tgtEl>
+                                      </p:cBhvr>
+                                    </p:animEffect>
+                                  </p:childTnLst>
+                                </p:cTn>
+                              </p:par>
+                            </p:childTnLst>
+                          </p:cTn>
+                        </p:par>
+                      </p:childTnLst>
+                    </p:cTn>
+                  </p:par>
+                  <p:par>
+                    <p:cTn id="13" fill="hold">
+                      <p:stCondLst>
+                        <p:cond delay="indefinite"/>
+                      </p:stCondLst>
+                      <p:childTnLst>
+                        <p:par>
+                          <p:cTn id="14" fill="hold">
+                            <p:stCondLst>
+                              <p:cond delay="0"/>
+                            </p:stCondLst>
+                            <p:childTnLst>
+                              <p:par>
+                                <p:cTn id="15" presetID="10" presetClass="entr" presetSubtype="0" fill="hold" nodeType="clickEffect">
+                                  <p:stCondLst>
+                                    <p:cond delay="0"/>
+                                  </p:stCondLst>
+                                  <p:childTnLst>
+                                    <p:set>
+                                      <p:cBhvr>
+                                        <p:cTn id="16" dur="1" fill="hold">
+                                          <p:stCondLst>
+                                            <p:cond delay="0"/>
+                                          </p:stCondLst>
+                                        </p:cTn>
+                                        <p:tgtEl>
+                                          <p:spTgt spid="5">
+                                            <p:txEl>
+                                              <p:pRg st="0" end="0"/>
+                                            </p:txEl>
+                                          </p:spTgt>
+                                        </p:tgtEl>
+                                        <p:attrNameLst>
+                                          <p:attrName>style.visibility</p:attrName>
+                                        </p:attrNameLst>
+                                      </p:cBhvr>
+                                      <p:to>
+                                        <p:strVal val="visible"/>
+                                      </p:to>
+                                    </p:set>
+                                    <p:animEffect transition="in" filter="fade">
+                                      <p:cBhvr>
+                                        <p:cTn id="17" dur="500"/>
+                                        <p:tgtEl>
+                                          <p:spTgt spid="5">
+                                            <p:txEl>
+                                              <p:pRg st="0" end="0"/>
+                                            </p:txEl>
+                                          </p:spTgt>
+                                        </p:tgtEl>
+                                      </p:cBhvr>
+                                    </p:animEffect>
+                                  </p:childTnLst>
+                                </p:cTn>
+                              </p:par>
+                            </p:childTnLst>
+                          </p:cTn>
+                        </p:par>
+                      </p:childTnLst>
+                    </p:cTn>
+                  </p:par>
+                </p:childTnLst>
+              </p:cTn>
+              <p:prevCondLst>
+                <p:cond evt="onPrev" delay="0">
+                  <p:tgtEl>
+                    <p:sldTgt/>
+                  </p:tgtEl>
+                </p:cond>
+              </p:prevCondLst>
+              <p:nextCondLst>
+                <p:cond evt="onNext" delay="0">
+                  <p:tgtEl>
+                    <p:sldTgt/>
+                  </p:tgtEl>
+                </p:cond>
+              </p:nextCondLst>
+            </p:seq>
+          </p:childTnLst>
+        </p:cTn>
+      </p:par>
+    </p:tnLst>
+    <p:bldLst>
+      <p:bldP spid="4" grpId="0"/>
+      <p:bldP spid="6" grpId="0"/>
+    </p:bldLst>
+  </p:timing>
+</p:sld>
+</file>
+
+<file path=ppt/slides/slide4.xml><?xml version="1.0" encoding="utf-8"?>
+<p:sld xmlns:a="http://schemas.openxmlformats.org/drawingml/2006/main" xmlns:r="http://schemas.openxmlformats.org/officeDocument/2006/relationships" xmlns:p="http://schemas.openxmlformats.org/presentationml/2006/main">
+  <p:cSld>
+    <p:spTree>
+      <p:nvGrpSpPr>
+        <p:cNvPr id="1" name=""/>
+        <p:cNvGrpSpPr/>
+        <p:nvPr/>
+      </p:nvGrpSpPr>
+      <p:grpSpPr>
+        <a:xfrm>
+          <a:off x="0" y="0"/>
+          <a:ext cx="0" cy="0"/>
+          <a:chOff x="0" y="0"/>
+          <a:chExt cx="0" cy="0"/>
+        </a:xfrm>
+      </p:grpSpPr>
+      <p:sp>
+        <p:nvSpPr>
+          <p:cNvPr id="3" name="Subtitle 2">
+            <a:extLst>
+              <a:ext uri="{FF2B5EF4-FFF2-40B4-BE49-F238E27FC236}">
+                <a16:creationId xmlns:a16="http://schemas.microsoft.com/office/drawing/2014/main" id="{C0C4B04F-C8A9-0D58-A02E-B1C288B5A3BE}"/>
+              </a:ext>
+            </a:extLst>
+          </p:cNvPr>
+          <p:cNvSpPr>
+            <a:spLocks noGrp="1"/>
+          </p:cNvSpPr>
+          <p:nvPr>
+            <p:ph type="subTitle" idx="1"/>
+          </p:nvPr>
+        </p:nvSpPr>
+        <p:spPr>
+          <a:xfrm>
+            <a:off x="879566" y="1888388"/>
+            <a:ext cx="5364480" cy="4601436"/>
+          </a:xfrm>
+        </p:spPr>
+        <p:txBody>
+          <a:bodyPr>
+            <a:normAutofit/>
+          </a:bodyPr>
+          <a:lstStyle/>
+          <a:p>
+            <a:r>
+              <a:rPr lang="en-US" sz="2600" dirty="0">
+                <a:solidFill>
+                  <a:schemeClr val="tx1"/>
+                </a:solidFill>
+              </a:rPr>
+              <a:t>{{content}}</a:t>
+            </a:r>
+          </a:p>
+        </p:txBody>
+      </p:sp>
+      <p:pic>
+        <p:nvPicPr>
+          <p:cNvPr id="5" name="DUMMY">
+            <a:extLst>
+              <a:ext uri="{FF2B5EF4-FFF2-40B4-BE49-F238E27FC236}">
+                <a16:creationId xmlns:a16="http://schemas.microsoft.com/office/drawing/2014/main" id="{3262D932-207A-12C0-47B9-E1CFFE9077E7}"/>
+              </a:ext>
+            </a:extLst>
+          </p:cNvPr>
+          <p:cNvPicPr>
+            <a:picLocks noChangeAspect="1"/>
+          </p:cNvPicPr>
+          <p:nvPr/>
+        </p:nvPicPr>
+        <p:blipFill>
+          <a:blip r:embed="rId2">
+            <a:extLst>
+              <a:ext uri="{28A0092B-C50C-407E-A947-70E740481C1C}">
+                <a14:useLocalDpi xmlns:a14="http://schemas.microsoft.com/office/drawing/2010/main" val="0"/>
+              </a:ext>
+            </a:extLst>
+          </a:blip>
+          <a:stretch>
+            <a:fillRect/>
+          </a:stretch>
+        </p:blipFill>
+        <p:spPr>
+          <a:xfrm>
+            <a:off x="6486010" y="1888388"/>
+            <a:ext cx="5420481" cy="4039164"/>
+          </a:xfrm>
+          <a:prstGeom prst="rect">
+            <a:avLst/>
+          </a:prstGeom>
+        </p:spPr>
+      </p:pic>
+      <p:sp>
+        <p:nvSpPr>
+          <p:cNvPr id="7" name="Title 1">
+            <a:extLst>
+              <a:ext uri="{FF2B5EF4-FFF2-40B4-BE49-F238E27FC236}">
+                <a16:creationId xmlns:a16="http://schemas.microsoft.com/office/drawing/2014/main" id="{9ACE2B90-F092-3AA8-4A2A-3D13F6A1A1D0}"/>
+              </a:ext>
+            </a:extLst>
+          </p:cNvPr>
+          <p:cNvSpPr txBox="1">
+            <a:spLocks/>
+          </p:cNvSpPr>
+          <p:nvPr/>
+        </p:nvSpPr>
+        <p:spPr>
+          <a:xfrm>
+            <a:off x="1175657" y="792480"/>
+            <a:ext cx="10546080" cy="853439"/>
+          </a:xfrm>
+          <a:prstGeom prst="rect">
+            <a:avLst/>
+          </a:prstGeom>
+        </p:spPr>
+        <p:txBody>
+          <a:bodyPr vert="horz" lIns="91440" tIns="45720" rIns="91440" bIns="45720" rtlCol="0" anchor="b">
+            <a:normAutofit/>
+          </a:bodyPr>
+          <a:lstStyle>
+            <a:lvl1pPr algn="l" defTabSz="914400" rtl="0" eaLnBrk="1" latinLnBrk="0" hangingPunct="1">
+              <a:lnSpc>
+                <a:spcPct val="90000"/>
+              </a:lnSpc>
+              <a:spcBef>
+                <a:spcPct val="0"/>
+              </a:spcBef>
+              <a:buNone/>
+              <a:defRPr sz="4800" kern="1200" cap="all" baseline="0">
+                <a:solidFill>
+                  <a:schemeClr val="tx1"/>
+                </a:solidFill>
+                <a:latin typeface="+mj-lt"/>
+                <a:ea typeface="+mj-ea"/>
+                <a:cs typeface="+mj-cs"/>
+              </a:defRPr>
+            </a:lvl1pPr>
+          </a:lstStyle>
+          <a:p>
+            <a:r>
+              <a:rPr lang="en-US" sz="5400"/>
+              <a:t>{{title}}</a:t>
+            </a:r>
+            <a:endParaRPr lang="en-US" sz="5400" dirty="0"/>
+          </a:p>
+        </p:txBody>
+      </p:sp>
+    </p:spTree>
+    <p:extLst>
+      <p:ext uri="{BB962C8B-B14F-4D97-AF65-F5344CB8AC3E}">
+        <p14:creationId xmlns:p14="http://schemas.microsoft.com/office/powerpoint/2010/main" val="1011216605"/>
       </p:ext>
     </p:extLst>
   </p:cSld>
@@ -13576,402 +14122,6 @@
                       </p:childTnLst>
                     </p:cTn>
                   </p:par>
-                  <p:par>
-                    <p:cTn id="8" fill="hold">
-                      <p:stCondLst>
-                        <p:cond delay="indefinite"/>
-                      </p:stCondLst>
-                      <p:childTnLst>
-                        <p:par>
-                          <p:cTn id="9" fill="hold">
-                            <p:stCondLst>
-                              <p:cond delay="0"/>
-                            </p:stCondLst>
-                            <p:childTnLst>
-                              <p:par>
-                                <p:cTn id="10" presetID="10" presetClass="entr" presetSubtype="0" fill="hold" grpId="0" nodeType="clickEffect">
-                                  <p:stCondLst>
-                                    <p:cond delay="0"/>
-                                  </p:stCondLst>
-                                  <p:childTnLst>
-                                    <p:set>
-                                      <p:cBhvr>
-                                        <p:cTn id="11" dur="1" fill="hold">
-                                          <p:stCondLst>
-                                            <p:cond delay="0"/>
-                                          </p:stCondLst>
-                                        </p:cTn>
-                                        <p:tgtEl>
-                                          <p:spTgt spid="4"/>
-                                        </p:tgtEl>
-                                        <p:attrNameLst>
-                                          <p:attrName>style.visibility</p:attrName>
-                                        </p:attrNameLst>
-                                      </p:cBhvr>
-                                      <p:to>
-                                        <p:strVal val="visible"/>
-                                      </p:to>
-                                    </p:set>
-                                    <p:animEffect transition="in" filter="fade">
-                                      <p:cBhvr>
-                                        <p:cTn id="12" dur="500"/>
-                                        <p:tgtEl>
-                                          <p:spTgt spid="4"/>
-                                        </p:tgtEl>
-                                      </p:cBhvr>
-                                    </p:animEffect>
-                                  </p:childTnLst>
-                                </p:cTn>
-                              </p:par>
-                            </p:childTnLst>
-                          </p:cTn>
-                        </p:par>
-                      </p:childTnLst>
-                    </p:cTn>
-                  </p:par>
-                  <p:par>
-                    <p:cTn id="13" fill="hold">
-                      <p:stCondLst>
-                        <p:cond delay="indefinite"/>
-                      </p:stCondLst>
-                      <p:childTnLst>
-                        <p:par>
-                          <p:cTn id="14" fill="hold">
-                            <p:stCondLst>
-                              <p:cond delay="0"/>
-                            </p:stCondLst>
-                            <p:childTnLst>
-                              <p:par>
-                                <p:cTn id="15" presetID="10" presetClass="entr" presetSubtype="0" fill="hold" grpId="0" nodeType="clickEffect">
-                                  <p:stCondLst>
-                                    <p:cond delay="0"/>
-                                  </p:stCondLst>
-                                  <p:childTnLst>
-                                    <p:set>
-                                      <p:cBhvr>
-                                        <p:cTn id="16" dur="1" fill="hold">
-                                          <p:stCondLst>
-                                            <p:cond delay="0"/>
-                                          </p:stCondLst>
-                                        </p:cTn>
-                                        <p:tgtEl>
-                                          <p:spTgt spid="5"/>
-                                        </p:tgtEl>
-                                        <p:attrNameLst>
-                                          <p:attrName>style.visibility</p:attrName>
-                                        </p:attrNameLst>
-                                      </p:cBhvr>
-                                      <p:to>
-                                        <p:strVal val="visible"/>
-                                      </p:to>
-                                    </p:set>
-                                    <p:animEffect transition="in" filter="fade">
-                                      <p:cBhvr>
-                                        <p:cTn id="17" dur="500"/>
-                                        <p:tgtEl>
-                                          <p:spTgt spid="5"/>
-                                        </p:tgtEl>
-                                      </p:cBhvr>
-                                    </p:animEffect>
-                                  </p:childTnLst>
-                                </p:cTn>
-                              </p:par>
-                            </p:childTnLst>
-                          </p:cTn>
-                        </p:par>
-                      </p:childTnLst>
-                    </p:cTn>
-                  </p:par>
-                </p:childTnLst>
-              </p:cTn>
-              <p:prevCondLst>
-                <p:cond evt="onPrev" delay="0">
-                  <p:tgtEl>
-                    <p:sldTgt/>
-                  </p:tgtEl>
-                </p:cond>
-              </p:prevCondLst>
-              <p:nextCondLst>
-                <p:cond evt="onNext" delay="0">
-                  <p:tgtEl>
-                    <p:sldTgt/>
-                  </p:tgtEl>
-                </p:cond>
-              </p:nextCondLst>
-            </p:seq>
-          </p:childTnLst>
-        </p:cTn>
-      </p:par>
-    </p:tnLst>
-    <p:bldLst>
-      <p:bldP spid="3" grpId="0" build="p"/>
-      <p:bldP spid="4" grpId="0"/>
-      <p:bldP spid="5" grpId="0"/>
-    </p:bldLst>
-  </p:timing>
-</p:sld>
-</file>
-
-<file path=ppt/slides/slide4.xml><?xml version="1.0" encoding="utf-8"?>
-<p:sld xmlns:a="http://schemas.openxmlformats.org/drawingml/2006/main" xmlns:r="http://schemas.openxmlformats.org/officeDocument/2006/relationships" xmlns:p="http://schemas.openxmlformats.org/presentationml/2006/main">
-  <p:cSld>
-    <p:spTree>
-      <p:nvGrpSpPr>
-        <p:cNvPr id="1" name=""/>
-        <p:cNvGrpSpPr/>
-        <p:nvPr/>
-      </p:nvGrpSpPr>
-      <p:grpSpPr>
-        <a:xfrm>
-          <a:off x="0" y="0"/>
-          <a:ext cx="0" cy="0"/>
-          <a:chOff x="0" y="0"/>
-          <a:chExt cx="0" cy="0"/>
-        </a:xfrm>
-      </p:grpSpPr>
-      <p:sp>
-        <p:nvSpPr>
-          <p:cNvPr id="2" name="Title 1">
-            <a:extLst>
-              <a:ext uri="{FF2B5EF4-FFF2-40B4-BE49-F238E27FC236}">
-                <a16:creationId xmlns:a16="http://schemas.microsoft.com/office/drawing/2014/main" id="{CE489713-2FC0-164D-152B-44FCB6E28F49}"/>
-              </a:ext>
-            </a:extLst>
-          </p:cNvPr>
-          <p:cNvSpPr>
-            <a:spLocks noGrp="1"/>
-          </p:cNvSpPr>
-          <p:nvPr>
-            <p:ph type="ctrTitle"/>
-          </p:nvPr>
-        </p:nvSpPr>
-        <p:spPr>
-          <a:xfrm>
-            <a:off x="1524000" y="313509"/>
-            <a:ext cx="9144000" cy="731928"/>
-          </a:xfrm>
-        </p:spPr>
-        <p:txBody>
-          <a:bodyPr>
-            <a:normAutofit/>
-          </a:bodyPr>
-          <a:lstStyle/>
-          <a:p>
-            <a:r>
-              <a:rPr lang="en-US" sz="4000" dirty="0"/>
-              <a:t>{{title}}</a:t>
-            </a:r>
-          </a:p>
-        </p:txBody>
-      </p:sp>
-      <p:sp>
-        <p:nvSpPr>
-          <p:cNvPr id="3" name="Subtitle 2">
-            <a:extLst>
-              <a:ext uri="{FF2B5EF4-FFF2-40B4-BE49-F238E27FC236}">
-                <a16:creationId xmlns:a16="http://schemas.microsoft.com/office/drawing/2014/main" id="{C0C4B04F-C8A9-0D58-A02E-B1C288B5A3BE}"/>
-              </a:ext>
-            </a:extLst>
-          </p:cNvPr>
-          <p:cNvSpPr>
-            <a:spLocks noGrp="1"/>
-          </p:cNvSpPr>
-          <p:nvPr>
-            <p:ph type="subTitle" idx="1"/>
-          </p:nvPr>
-        </p:nvSpPr>
-        <p:spPr>
-          <a:xfrm>
-            <a:off x="914400" y="1773238"/>
-            <a:ext cx="5364480" cy="4601436"/>
-          </a:xfrm>
-        </p:spPr>
-        <p:txBody>
-          <a:bodyPr/>
-          <a:lstStyle/>
-          <a:p>
-            <a:r>
-              <a:rPr lang="en-US" dirty="0">
-                <a:solidFill>
-                  <a:schemeClr val="tx1"/>
-                </a:solidFill>
-              </a:rPr>
-              <a:t>{{content}}</a:t>
-            </a:r>
-          </a:p>
-        </p:txBody>
-      </p:sp>
-      <p:pic>
-        <p:nvPicPr>
-          <p:cNvPr id="5" name="DUMMY">
-            <a:extLst>
-              <a:ext uri="{FF2B5EF4-FFF2-40B4-BE49-F238E27FC236}">
-                <a16:creationId xmlns:a16="http://schemas.microsoft.com/office/drawing/2014/main" id="{3262D932-207A-12C0-47B9-E1CFFE9077E7}"/>
-              </a:ext>
-            </a:extLst>
-          </p:cNvPr>
-          <p:cNvPicPr>
-            <a:picLocks noChangeAspect="1"/>
-          </p:cNvPicPr>
-          <p:nvPr/>
-        </p:nvPicPr>
-        <p:blipFill>
-          <a:blip r:embed="rId2">
-            <a:extLst>
-              <a:ext uri="{28A0092B-C50C-407E-A947-70E740481C1C}">
-                <a14:useLocalDpi xmlns:a14="http://schemas.microsoft.com/office/drawing/2010/main" val="0"/>
-              </a:ext>
-            </a:extLst>
-          </a:blip>
-          <a:stretch>
-            <a:fillRect/>
-          </a:stretch>
-        </p:blipFill>
-        <p:spPr>
-          <a:xfrm>
-            <a:off x="6486010" y="1888388"/>
-            <a:ext cx="5420481" cy="4039164"/>
-          </a:xfrm>
-          <a:prstGeom prst="rect">
-            <a:avLst/>
-          </a:prstGeom>
-        </p:spPr>
-      </p:pic>
-    </p:spTree>
-    <p:extLst>
-      <p:ext uri="{BB962C8B-B14F-4D97-AF65-F5344CB8AC3E}">
-        <p14:creationId xmlns:p14="http://schemas.microsoft.com/office/powerpoint/2010/main" val="1011216605"/>
-      </p:ext>
-    </p:extLst>
-  </p:cSld>
-  <p:clrMapOvr>
-    <a:masterClrMapping/>
-  </p:clrMapOvr>
-  <p:transition spd="slow">
-    <p:wipe/>
-  </p:transition>
-  <p:timing>
-    <p:tnLst>
-      <p:par>
-        <p:cTn id="1" dur="indefinite" restart="never" nodeType="tmRoot">
-          <p:childTnLst>
-            <p:seq concurrent="1" nextAc="seek">
-              <p:cTn id="2" dur="indefinite" nodeType="mainSeq">
-                <p:childTnLst>
-                  <p:par>
-                    <p:cTn id="3" fill="hold">
-                      <p:stCondLst>
-                        <p:cond delay="indefinite"/>
-                      </p:stCondLst>
-                      <p:childTnLst>
-                        <p:par>
-                          <p:cTn id="4" fill="hold">
-                            <p:stCondLst>
-                              <p:cond delay="0"/>
-                            </p:stCondLst>
-                            <p:childTnLst>
-                              <p:par>
-                                <p:cTn id="5" presetID="10" presetClass="entr" presetSubtype="0" fill="hold" nodeType="clickEffect">
-                                  <p:stCondLst>
-                                    <p:cond delay="0"/>
-                                  </p:stCondLst>
-                                  <p:childTnLst>
-                                    <p:set>
-                                      <p:cBhvr>
-                                        <p:cTn id="6" dur="1" fill="hold">
-                                          <p:stCondLst>
-                                            <p:cond delay="0"/>
-                                          </p:stCondLst>
-                                        </p:cTn>
-                                        <p:tgtEl>
-                                          <p:spTgt spid="5"/>
-                                        </p:tgtEl>
-                                        <p:attrNameLst>
-                                          <p:attrName>style.visibility</p:attrName>
-                                        </p:attrNameLst>
-                                      </p:cBhvr>
-                                      <p:to>
-                                        <p:strVal val="visible"/>
-                                      </p:to>
-                                    </p:set>
-                                    <p:animEffect transition="in" filter="fade">
-                                      <p:cBhvr>
-                                        <p:cTn id="7" dur="500"/>
-                                        <p:tgtEl>
-                                          <p:spTgt spid="5"/>
-                                        </p:tgtEl>
-                                      </p:cBhvr>
-                                    </p:animEffect>
-                                  </p:childTnLst>
-                                </p:cTn>
-                              </p:par>
-                            </p:childTnLst>
-                          </p:cTn>
-                        </p:par>
-                      </p:childTnLst>
-                    </p:cTn>
-                  </p:par>
-                  <p:par>
-                    <p:cTn id="8" fill="hold">
-                      <p:stCondLst>
-                        <p:cond delay="indefinite"/>
-                      </p:stCondLst>
-                      <p:childTnLst>
-                        <p:par>
-                          <p:cTn id="9" fill="hold">
-                            <p:stCondLst>
-                              <p:cond delay="0"/>
-                            </p:stCondLst>
-                            <p:childTnLst>
-                              <p:par>
-                                <p:cTn id="10" presetID="10" presetClass="entr" presetSubtype="0" fill="hold" grpId="0" nodeType="clickEffect">
-                                  <p:stCondLst>
-                                    <p:cond delay="0"/>
-                                  </p:stCondLst>
-                                  <p:childTnLst>
-                                    <p:set>
-                                      <p:cBhvr>
-                                        <p:cTn id="11" dur="1" fill="hold">
-                                          <p:stCondLst>
-                                            <p:cond delay="0"/>
-                                          </p:stCondLst>
-                                        </p:cTn>
-                                        <p:tgtEl>
-                                          <p:spTgt spid="3">
-                                            <p:txEl>
-                                              <p:pRg st="0" end="0"/>
-                                            </p:txEl>
-                                          </p:spTgt>
-                                        </p:tgtEl>
-                                        <p:attrNameLst>
-                                          <p:attrName>style.visibility</p:attrName>
-                                        </p:attrNameLst>
-                                      </p:cBhvr>
-                                      <p:to>
-                                        <p:strVal val="visible"/>
-                                      </p:to>
-                                    </p:set>
-                                    <p:animEffect transition="in" filter="fade">
-                                      <p:cBhvr>
-                                        <p:cTn id="12" dur="500"/>
-                                        <p:tgtEl>
-                                          <p:spTgt spid="3">
-                                            <p:txEl>
-                                              <p:pRg st="0" end="0"/>
-                                            </p:txEl>
-                                          </p:spTgt>
-                                        </p:tgtEl>
-                                      </p:cBhvr>
-                                    </p:animEffect>
-                                  </p:childTnLst>
-                                </p:cTn>
-                              </p:par>
-                            </p:childTnLst>
-                          </p:cTn>
-                        </p:par>
-                      </p:childTnLst>
-                    </p:cTn>
-                  </p:par>
                 </p:childTnLst>
               </p:cTn>
               <p:prevCondLst>
@@ -14017,41 +14167,6 @@
           <a:chExt cx="0" cy="0"/>
         </a:xfrm>
       </p:grpSpPr>
-      <p:sp>
-        <p:nvSpPr>
-          <p:cNvPr id="2" name="Title 1">
-            <a:extLst>
-              <a:ext uri="{FF2B5EF4-FFF2-40B4-BE49-F238E27FC236}">
-                <a16:creationId xmlns:a16="http://schemas.microsoft.com/office/drawing/2014/main" id="{CE489713-2FC0-164D-152B-44FCB6E28F49}"/>
-              </a:ext>
-            </a:extLst>
-          </p:cNvPr>
-          <p:cNvSpPr>
-            <a:spLocks noGrp="1"/>
-          </p:cNvSpPr>
-          <p:nvPr>
-            <p:ph type="ctrTitle"/>
-          </p:nvPr>
-        </p:nvSpPr>
-        <p:spPr>
-          <a:xfrm>
-            <a:off x="1524000" y="313509"/>
-            <a:ext cx="9144000" cy="731928"/>
-          </a:xfrm>
-        </p:spPr>
-        <p:txBody>
-          <a:bodyPr>
-            <a:normAutofit/>
-          </a:bodyPr>
-          <a:lstStyle/>
-          <a:p>
-            <a:r>
-              <a:rPr lang="en-US" sz="4000" dirty="0"/>
-              <a:t>{{title}}</a:t>
-            </a:r>
-          </a:p>
-        </p:txBody>
-      </p:sp>
       <p:pic>
         <p:nvPicPr>
           <p:cNvPr id="5" name="DUMMY">
@@ -14080,14 +14195,49 @@
         </p:blipFill>
         <p:spPr>
           <a:xfrm>
-            <a:off x="1524000" y="1217828"/>
-            <a:ext cx="9144000" cy="5121487"/>
+            <a:off x="1842743" y="1889760"/>
+            <a:ext cx="8506513" cy="4764435"/>
           </a:xfrm>
           <a:prstGeom prst="rect">
             <a:avLst/>
           </a:prstGeom>
         </p:spPr>
       </p:pic>
+      <p:sp>
+        <p:nvSpPr>
+          <p:cNvPr id="4" name="Title 1">
+            <a:extLst>
+              <a:ext uri="{FF2B5EF4-FFF2-40B4-BE49-F238E27FC236}">
+                <a16:creationId xmlns:a16="http://schemas.microsoft.com/office/drawing/2014/main" id="{1D156AD6-A4E7-AEB1-51A6-1ED774C31CA6}"/>
+              </a:ext>
+            </a:extLst>
+          </p:cNvPr>
+          <p:cNvSpPr>
+            <a:spLocks noGrp="1"/>
+          </p:cNvSpPr>
+          <p:nvPr>
+            <p:ph type="ctrTitle"/>
+          </p:nvPr>
+        </p:nvSpPr>
+        <p:spPr>
+          <a:xfrm>
+            <a:off x="1175657" y="792480"/>
+            <a:ext cx="10546080" cy="853439"/>
+          </a:xfrm>
+        </p:spPr>
+        <p:txBody>
+          <a:bodyPr>
+            <a:normAutofit/>
+          </a:bodyPr>
+          <a:lstStyle/>
+          <a:p>
+            <a:r>
+              <a:rPr lang="en-US" sz="5400" dirty="0"/>
+              <a:t>{{title}}</a:t>
+            </a:r>
+          </a:p>
+        </p:txBody>
+      </p:sp>
     </p:spTree>
     <p:extLst>
       <p:ext uri="{BB962C8B-B14F-4D97-AF65-F5344CB8AC3E}">
@@ -14101,89 +14251,6 @@
   <p:transition spd="slow">
     <p:wipe/>
   </p:transition>
-  <p:timing>
-    <p:tnLst>
-      <p:par>
-        <p:cTn id="1" dur="indefinite" restart="never" nodeType="tmRoot">
-          <p:childTnLst>
-            <p:seq concurrent="1" nextAc="seek">
-              <p:cTn id="2" dur="indefinite" nodeType="mainSeq">
-                <p:childTnLst>
-                  <p:par>
-                    <p:cTn id="3" fill="hold">
-                      <p:stCondLst>
-                        <p:cond delay="indefinite"/>
-                      </p:stCondLst>
-                      <p:childTnLst>
-                        <p:par>
-                          <p:cTn id="4" fill="hold">
-                            <p:stCondLst>
-                              <p:cond delay="0"/>
-                            </p:stCondLst>
-                            <p:childTnLst>
-                              <p:par>
-                                <p:cTn id="5" presetID="10" presetClass="entr" presetSubtype="0" fill="hold" nodeType="clickEffect">
-                                  <p:stCondLst>
-                                    <p:cond delay="0"/>
-                                  </p:stCondLst>
-                                  <p:childTnLst>
-                                    <p:set>
-                                      <p:cBhvr>
-                                        <p:cTn id="6" dur="1" fill="hold">
-                                          <p:stCondLst>
-                                            <p:cond delay="0"/>
-                                          </p:stCondLst>
-                                        </p:cTn>
-                                        <p:tgtEl>
-                                          <p:spTgt spid="5"/>
-                                        </p:tgtEl>
-                                        <p:attrNameLst>
-                                          <p:attrName>style.visibility</p:attrName>
-                                        </p:attrNameLst>
-                                      </p:cBhvr>
-                                      <p:to>
-                                        <p:strVal val="visible"/>
-                                      </p:to>
-                                    </p:set>
-                                    <p:animEffect transition="in" filter="fade">
-                                      <p:cBhvr>
-                                        <p:cTn id="7" dur="500"/>
-                                        <p:tgtEl>
-                                          <p:spTgt spid="5"/>
-                                        </p:tgtEl>
-                                      </p:cBhvr>
-                                    </p:animEffect>
-                                  </p:childTnLst>
-                                </p:cTn>
-                              </p:par>
-                            </p:childTnLst>
-                          </p:cTn>
-                        </p:par>
-                      </p:childTnLst>
-                    </p:cTn>
-                  </p:par>
-                </p:childTnLst>
-              </p:cTn>
-              <p:prevCondLst>
-                <p:cond evt="onPrev" delay="0">
-                  <p:tgtEl>
-                    <p:sldTgt/>
-                  </p:tgtEl>
-                </p:cond>
-              </p:prevCondLst>
-              <p:nextCondLst>
-                <p:cond evt="onNext" delay="0">
-                  <p:tgtEl>
-                    <p:sldTgt/>
-                  </p:tgtEl>
-                </p:cond>
-              </p:nextCondLst>
-            </p:seq>
-          </p:childTnLst>
-        </p:cTn>
-      </p:par>
-    </p:tnLst>
-  </p:timing>
 </p:sld>
 </file>
 

</xml_diff>